<commit_message>
Final commit; changes made during the meetup
</commit_message>
<xml_diff>
--- a/angularjs-meetup-portland.pptx
+++ b/angularjs-meetup-portland.pptx
@@ -5,21 +5,22 @@
     <p:sldMasterId id="2147483672" r:id="rId1"/>
   </p:sldMasterIdLst>
   <p:notesMasterIdLst>
-    <p:notesMasterId r:id="rId14"/>
+    <p:notesMasterId r:id="rId15"/>
   </p:notesMasterIdLst>
   <p:sldIdLst>
     <p:sldId id="256" r:id="rId2"/>
     <p:sldId id="261" r:id="rId3"/>
     <p:sldId id="268" r:id="rId4"/>
-    <p:sldId id="259" r:id="rId5"/>
-    <p:sldId id="258" r:id="rId6"/>
-    <p:sldId id="260" r:id="rId7"/>
-    <p:sldId id="262" r:id="rId8"/>
-    <p:sldId id="263" r:id="rId9"/>
+    <p:sldId id="269" r:id="rId5"/>
+    <p:sldId id="259" r:id="rId6"/>
+    <p:sldId id="258" r:id="rId7"/>
+    <p:sldId id="260" r:id="rId8"/>
+    <p:sldId id="262" r:id="rId9"/>
     <p:sldId id="264" r:id="rId10"/>
-    <p:sldId id="265" r:id="rId11"/>
-    <p:sldId id="266" r:id="rId12"/>
-    <p:sldId id="267" r:id="rId13"/>
+    <p:sldId id="263" r:id="rId11"/>
+    <p:sldId id="265" r:id="rId12"/>
+    <p:sldId id="266" r:id="rId13"/>
+    <p:sldId id="267" r:id="rId14"/>
   </p:sldIdLst>
   <p:sldSz cx="9144000" cy="6858000" type="screen4x3"/>
   <p:notesSz cx="6858000" cy="9144000"/>
@@ -601,50 +602,33 @@
           <a:p>
             <a:r>
               <a:rPr lang="en-US" dirty="0" smtClean="0"/>
-              <a:t>-Always been easy</a:t>
+              <a:t>-Engineering director at ADP responsible for Core Services and</a:t>
             </a:r>
             <a:r>
               <a:rPr lang="en-US" baseline="0" dirty="0" smtClean="0"/>
-              <a:t> to not adhere to good engineering principles when using JavaScript</a:t>
-            </a:r>
-          </a:p>
-          <a:p>
+              <a:t> Continuous Delivery of a large, green </a:t>
+            </a:r>
+            <a:r>
+              <a:rPr lang="en-US" baseline="0" smtClean="0"/>
+              <a:t>field application</a:t>
+            </a:r>
+            <a:endParaRPr lang="en-US" dirty="0" smtClean="0"/>
+          </a:p>
+          <a:p>
+            <a:r>
+              <a:rPr lang="en-US" dirty="0" smtClean="0"/>
+              <a:t>-Prior to ADP, owned a startup focused</a:t>
+            </a:r>
             <a:r>
               <a:rPr lang="en-US" baseline="0" dirty="0" smtClean="0"/>
-              <a:t>-on a large scale, enterprise application, we needed a way to allow engineers autonomy, but not color outside of the lines</a:t>
+              <a:t> on IP video solutions</a:t>
             </a:r>
           </a:p>
           <a:p>
             <a:r>
               <a:rPr lang="en-US" baseline="0" dirty="0" smtClean="0"/>
-              <a:t>-Angular is a framework that isn’t extremely opinionated</a:t>
-            </a:r>
-          </a:p>
-          <a:p>
-            <a:r>
-              <a:rPr lang="en-US" baseline="0" dirty="0" smtClean="0"/>
-              <a:t>	-you can use it on just part of a page</a:t>
-            </a:r>
-          </a:p>
-          <a:p>
-            <a:r>
-              <a:rPr lang="en-US" baseline="0" dirty="0" smtClean="0"/>
-              <a:t>	-directory structure is not defined for you</a:t>
-            </a:r>
-          </a:p>
-          <a:p>
-            <a:r>
-              <a:rPr lang="en-US" baseline="0" dirty="0" smtClean="0"/>
-              <a:t>	-conventions exists for stereotypes such as Controller, Service, </a:t>
-            </a:r>
-            <a:r>
-              <a:rPr lang="en-US" baseline="0" dirty="0" err="1" smtClean="0"/>
-              <a:t>etc</a:t>
-            </a:r>
-            <a:endParaRPr lang="en-US" baseline="0" dirty="0" smtClean="0"/>
-          </a:p>
-          <a:p>
-            <a:endParaRPr lang="en-US" dirty="0"/>
+              <a:t>-Polyglot programmer with experience in C#, Java, JavaScript, Perl, Objective-C, and others</a:t>
+            </a:r>
           </a:p>
         </p:txBody>
       </p:sp>
@@ -665,7 +649,7 @@
           <a:p>
             <a:fld id="{A386C675-DD47-B74C-ABE9-0ED036F1B65F}" type="slidenum">
               <a:rPr lang="en-US" smtClean="0"/>
-              <a:t>4</a:t>
+              <a:t>3</a:t>
             </a:fld>
             <a:endParaRPr lang="en-US"/>
           </a:p>
@@ -674,7 +658,7 @@
     </p:spTree>
     <p:extLst>
       <p:ext uri="{BB962C8B-B14F-4D97-AF65-F5344CB8AC3E}">
-        <p14:creationId xmlns:p14="http://schemas.microsoft.com/office/powerpoint/2010/main" val="1622205514"/>
+        <p14:creationId xmlns:p14="http://schemas.microsoft.com/office/powerpoint/2010/main" val="3236759061"/>
       </p:ext>
     </p:extLst>
   </p:cSld>
@@ -730,6 +714,194 @@
           <a:p>
             <a:r>
               <a:rPr lang="en-US" dirty="0" smtClean="0"/>
+              <a:t>-Always been easy</a:t>
+            </a:r>
+            <a:r>
+              <a:rPr lang="en-US" baseline="0" dirty="0" smtClean="0"/>
+              <a:t> to not adhere to good engineering principles when using JavaScript</a:t>
+            </a:r>
+          </a:p>
+          <a:p>
+            <a:r>
+              <a:rPr lang="en-US" baseline="0" dirty="0" smtClean="0"/>
+              <a:t>-on a large scale, enterprise application, we needed a way to allow engineers autonomy, but not color outside of the lines</a:t>
+            </a:r>
+          </a:p>
+          <a:p>
+            <a:r>
+              <a:rPr lang="en-US" baseline="0" dirty="0" smtClean="0"/>
+              <a:t>-library </a:t>
+            </a:r>
+            <a:r>
+              <a:rPr lang="en-US" baseline="0" dirty="0" err="1" smtClean="0"/>
+              <a:t>vs</a:t>
+            </a:r>
+            <a:r>
+              <a:rPr lang="en-US" baseline="0" dirty="0" smtClean="0"/>
+              <a:t> framework</a:t>
+            </a:r>
+          </a:p>
+          <a:p>
+            <a:r>
+              <a:rPr lang="en-US" baseline="0" dirty="0" smtClean="0"/>
+              <a:t>	-you call a library, can abstract and swap them out, typically serve a narrow purpose</a:t>
+            </a:r>
+          </a:p>
+          <a:p>
+            <a:r>
+              <a:rPr lang="en-US" baseline="0" dirty="0" smtClean="0"/>
+              <a:t>	-develop into a framework, it is weaved throughout your application, harder to migrate away from (Spring is an example)</a:t>
+            </a:r>
+          </a:p>
+          <a:p>
+            <a:r>
+              <a:rPr lang="en-US" baseline="0" dirty="0" smtClean="0"/>
+              <a:t>	-</a:t>
+            </a:r>
+            <a:r>
+              <a:rPr lang="en-US" baseline="0" dirty="0" err="1" smtClean="0"/>
+              <a:t>CanJS</a:t>
+            </a:r>
+            <a:r>
+              <a:rPr lang="en-US" baseline="0" dirty="0" smtClean="0"/>
+              <a:t> &amp; </a:t>
+            </a:r>
+            <a:r>
+              <a:rPr lang="en-US" baseline="0" dirty="0" err="1" smtClean="0"/>
+              <a:t>KnockoutJS</a:t>
+            </a:r>
+            <a:r>
+              <a:rPr lang="en-US" baseline="0" dirty="0" smtClean="0"/>
+              <a:t> are libraries</a:t>
+            </a:r>
+          </a:p>
+          <a:p>
+            <a:r>
+              <a:rPr lang="en-US" baseline="0" dirty="0" smtClean="0"/>
+              <a:t>	-</a:t>
+            </a:r>
+            <a:r>
+              <a:rPr lang="en-US" baseline="0" dirty="0" err="1" smtClean="0"/>
+              <a:t>EmberJS</a:t>
+            </a:r>
+            <a:r>
+              <a:rPr lang="en-US" baseline="0" dirty="0" smtClean="0"/>
+              <a:t> is an extremely opinionated framework</a:t>
+            </a:r>
+          </a:p>
+          <a:p>
+            <a:r>
+              <a:rPr lang="en-US" baseline="0" dirty="0" smtClean="0"/>
+              <a:t>-Angular is a framework, not so opinionated</a:t>
+            </a:r>
+          </a:p>
+          <a:p>
+            <a:r>
+              <a:rPr lang="en-US" baseline="0" dirty="0" smtClean="0"/>
+              <a:t>	-you can use it on just part of a page</a:t>
+            </a:r>
+          </a:p>
+          <a:p>
+            <a:r>
+              <a:rPr lang="en-US" baseline="0" dirty="0" smtClean="0"/>
+              <a:t>	-directory structure is not defined for you</a:t>
+            </a:r>
+          </a:p>
+          <a:p>
+            <a:r>
+              <a:rPr lang="en-US" baseline="0" dirty="0" smtClean="0"/>
+              <a:t>	-conventions exist for stereotypes such as Controller, Service, </a:t>
+            </a:r>
+            <a:r>
+              <a:rPr lang="en-US" baseline="0" dirty="0" err="1" smtClean="0"/>
+              <a:t>etc</a:t>
+            </a:r>
+            <a:endParaRPr lang="en-US" baseline="0" dirty="0" smtClean="0"/>
+          </a:p>
+        </p:txBody>
+      </p:sp>
+      <p:sp>
+        <p:nvSpPr>
+          <p:cNvPr id="4" name="Slide Number Placeholder 3"/>
+          <p:cNvSpPr>
+            <a:spLocks noGrp="1"/>
+          </p:cNvSpPr>
+          <p:nvPr>
+            <p:ph type="sldNum" sz="quarter" idx="10"/>
+          </p:nvPr>
+        </p:nvSpPr>
+        <p:spPr/>
+        <p:txBody>
+          <a:bodyPr/>
+          <a:lstStyle/>
+          <a:p>
+            <a:fld id="{A386C675-DD47-B74C-ABE9-0ED036F1B65F}" type="slidenum">
+              <a:rPr lang="en-US" smtClean="0"/>
+              <a:t>5</a:t>
+            </a:fld>
+            <a:endParaRPr lang="en-US"/>
+          </a:p>
+        </p:txBody>
+      </p:sp>
+    </p:spTree>
+    <p:extLst>
+      <p:ext uri="{BB962C8B-B14F-4D97-AF65-F5344CB8AC3E}">
+        <p14:creationId xmlns:p14="http://schemas.microsoft.com/office/powerpoint/2010/main" val="1622205514"/>
+      </p:ext>
+    </p:extLst>
+  </p:cSld>
+  <p:clrMapOvr>
+    <a:masterClrMapping/>
+  </p:clrMapOvr>
+</p:notes>
+</file>
+
+<file path=ppt/notesSlides/notesSlide4.xml><?xml version="1.0" encoding="utf-8"?>
+<p:notes xmlns:a="http://schemas.openxmlformats.org/drawingml/2006/main" xmlns:r="http://schemas.openxmlformats.org/officeDocument/2006/relationships" xmlns:p="http://schemas.openxmlformats.org/presentationml/2006/main">
+  <p:cSld>
+    <p:spTree>
+      <p:nvGrpSpPr>
+        <p:cNvPr id="1" name=""/>
+        <p:cNvGrpSpPr/>
+        <p:nvPr/>
+      </p:nvGrpSpPr>
+      <p:grpSpPr>
+        <a:xfrm>
+          <a:off x="0" y="0"/>
+          <a:ext cx="0" cy="0"/>
+          <a:chOff x="0" y="0"/>
+          <a:chExt cx="0" cy="0"/>
+        </a:xfrm>
+      </p:grpSpPr>
+      <p:sp>
+        <p:nvSpPr>
+          <p:cNvPr id="2" name="Slide Image Placeholder 1"/>
+          <p:cNvSpPr>
+            <a:spLocks noGrp="1" noRot="1" noChangeAspect="1"/>
+          </p:cNvSpPr>
+          <p:nvPr>
+            <p:ph type="sldImg"/>
+          </p:nvPr>
+        </p:nvSpPr>
+        <p:spPr/>
+      </p:sp>
+      <p:sp>
+        <p:nvSpPr>
+          <p:cNvPr id="3" name="Notes Placeholder 2"/>
+          <p:cNvSpPr>
+            <a:spLocks noGrp="1"/>
+          </p:cNvSpPr>
+          <p:nvPr>
+            <p:ph type="body" idx="1"/>
+          </p:nvPr>
+        </p:nvSpPr>
+        <p:spPr/>
+        <p:txBody>
+          <a:bodyPr/>
+          <a:lstStyle/>
+          <a:p>
+            <a:r>
+              <a:rPr lang="en-US" dirty="0" smtClean="0"/>
               <a:t>-Tell</a:t>
             </a:r>
             <a:r>
@@ -792,7 +964,7 @@
           <a:p>
             <a:fld id="{A386C675-DD47-B74C-ABE9-0ED036F1B65F}" type="slidenum">
               <a:rPr lang="en-US" smtClean="0"/>
-              <a:t>5</a:t>
+              <a:t>6</a:t>
             </a:fld>
             <a:endParaRPr lang="en-US"/>
           </a:p>
@@ -4651,47 +4823,44 @@
           <a:p>
             <a:r>
               <a:rPr lang="en-US" dirty="0" smtClean="0"/>
-              <a:t>A built-in framework to mock modules</a:t>
+              <a:t>Don’t call us, we’ll call you</a:t>
             </a:r>
           </a:p>
           <a:p>
             <a:r>
               <a:rPr lang="en-US" dirty="0" smtClean="0"/>
-              <a:t>Provides a test runner (Karma)</a:t>
+              <a:t>Mock dependencies for fast, clean unit tests</a:t>
             </a:r>
           </a:p>
           <a:p>
             <a:r>
               <a:rPr lang="en-US" dirty="0" smtClean="0"/>
-              <a:t>Dependency injection creates the seams for mocks, spies</a:t>
-            </a:r>
-          </a:p>
+              <a:t>Reduce unnecessary, boilerplate object construction code</a:t>
+            </a:r>
+          </a:p>
+          <a:p>
+            <a:endParaRPr lang="en-US" dirty="0"/>
+          </a:p>
+        </p:txBody>
+      </p:sp>
+      <p:sp>
+        <p:nvSpPr>
+          <p:cNvPr id="3" name="Title 2"/>
+          <p:cNvSpPr>
+            <a:spLocks noGrp="1"/>
+          </p:cNvSpPr>
+          <p:nvPr>
+            <p:ph type="title"/>
+          </p:nvPr>
+        </p:nvSpPr>
+        <p:spPr/>
+        <p:txBody>
+          <a:bodyPr/>
+          <a:lstStyle/>
           <a:p>
             <a:r>
               <a:rPr lang="en-US" dirty="0" smtClean="0"/>
-              <a:t>Built-in support for mocking HTTP back-ends</a:t>
-            </a:r>
-          </a:p>
-        </p:txBody>
-      </p:sp>
-      <p:sp>
-        <p:nvSpPr>
-          <p:cNvPr id="3" name="Title 2"/>
-          <p:cNvSpPr>
-            <a:spLocks noGrp="1"/>
-          </p:cNvSpPr>
-          <p:nvPr>
-            <p:ph type="title"/>
-          </p:nvPr>
-        </p:nvSpPr>
-        <p:spPr/>
-        <p:txBody>
-          <a:bodyPr/>
-          <a:lstStyle/>
-          <a:p>
-            <a:r>
-              <a:rPr lang="en-US" dirty="0" smtClean="0"/>
-              <a:t>Testability</a:t>
+              <a:t>Dependency Injection</a:t>
             </a:r>
             <a:endParaRPr lang="en-US" dirty="0"/>
           </a:p>
@@ -4753,7 +4922,7 @@
     </p:spTree>
     <p:extLst>
       <p:ext uri="{BB962C8B-B14F-4D97-AF65-F5344CB8AC3E}">
-        <p14:creationId xmlns:p14="http://schemas.microsoft.com/office/powerpoint/2010/main" val="401550413"/>
+        <p14:creationId xmlns:p14="http://schemas.microsoft.com/office/powerpoint/2010/main" val="1193094378"/>
       </p:ext>
     </p:extLst>
   </p:cSld>
@@ -4804,6 +4973,159 @@
           <a:p>
             <a:r>
               <a:rPr lang="en-US" dirty="0" smtClean="0"/>
+              <a:t>A built-in framework to mock modules</a:t>
+            </a:r>
+          </a:p>
+          <a:p>
+            <a:r>
+              <a:rPr lang="en-US" dirty="0" smtClean="0"/>
+              <a:t>Provides a test runner (Karma)</a:t>
+            </a:r>
+          </a:p>
+          <a:p>
+            <a:r>
+              <a:rPr lang="en-US" dirty="0" smtClean="0"/>
+              <a:t>Dependency injection creates the seams for mocks, spies</a:t>
+            </a:r>
+          </a:p>
+          <a:p>
+            <a:r>
+              <a:rPr lang="en-US" dirty="0" smtClean="0"/>
+              <a:t>Built-in support for mocking HTTP back-ends</a:t>
+            </a:r>
+          </a:p>
+        </p:txBody>
+      </p:sp>
+      <p:sp>
+        <p:nvSpPr>
+          <p:cNvPr id="3" name="Title 2"/>
+          <p:cNvSpPr>
+            <a:spLocks noGrp="1"/>
+          </p:cNvSpPr>
+          <p:nvPr>
+            <p:ph type="title"/>
+          </p:nvPr>
+        </p:nvSpPr>
+        <p:spPr/>
+        <p:txBody>
+          <a:bodyPr/>
+          <a:lstStyle/>
+          <a:p>
+            <a:r>
+              <a:rPr lang="en-US" dirty="0" smtClean="0"/>
+              <a:t>Testability</a:t>
+            </a:r>
+            <a:endParaRPr lang="en-US" dirty="0"/>
+          </a:p>
+        </p:txBody>
+      </p:sp>
+      <p:sp>
+        <p:nvSpPr>
+          <p:cNvPr id="4" name="TextBox 3"/>
+          <p:cNvSpPr txBox="1"/>
+          <p:nvPr/>
+        </p:nvSpPr>
+        <p:spPr>
+          <a:xfrm>
+            <a:off x="1418333" y="3658510"/>
+            <a:ext cx="6307335" cy="1077218"/>
+          </a:xfrm>
+          <a:prstGeom prst="rect">
+            <a:avLst/>
+          </a:prstGeom>
+        </p:spPr>
+        <p:style>
+          <a:lnRef idx="2">
+            <a:schemeClr val="accent6">
+              <a:shade val="50000"/>
+            </a:schemeClr>
+          </a:lnRef>
+          <a:fillRef idx="1">
+            <a:schemeClr val="accent6"/>
+          </a:fillRef>
+          <a:effectRef idx="0">
+            <a:schemeClr val="accent6"/>
+          </a:effectRef>
+          <a:fontRef idx="minor">
+            <a:schemeClr val="lt1"/>
+          </a:fontRef>
+        </p:style>
+        <p:txBody>
+          <a:bodyPr wrap="none" rtlCol="0">
+            <a:spAutoFit/>
+          </a:bodyPr>
+          <a:lstStyle/>
+          <a:p>
+            <a:pPr algn="ctr"/>
+            <a:r>
+              <a:rPr lang="en-US" sz="3200" i="1" dirty="0" smtClean="0"/>
+              <a:t>Less code - </a:t>
+            </a:r>
+          </a:p>
+          <a:p>
+            <a:pPr algn="ctr"/>
+            <a:r>
+              <a:rPr lang="en-US" sz="3200" i="1" dirty="0" smtClean="0"/>
+              <a:t>Easier to test &amp; More maintainable</a:t>
+            </a:r>
+            <a:endParaRPr lang="en-US" sz="3200" i="1" dirty="0"/>
+          </a:p>
+        </p:txBody>
+      </p:sp>
+    </p:spTree>
+    <p:extLst>
+      <p:ext uri="{BB962C8B-B14F-4D97-AF65-F5344CB8AC3E}">
+        <p14:creationId xmlns:p14="http://schemas.microsoft.com/office/powerpoint/2010/main" val="401550413"/>
+      </p:ext>
+    </p:extLst>
+  </p:cSld>
+  <p:clrMapOvr>
+    <a:masterClrMapping/>
+  </p:clrMapOvr>
+  <p:timing>
+    <p:tnLst>
+      <p:par>
+        <p:cTn xmlns:p14="http://schemas.microsoft.com/office/powerpoint/2010/main" id="1" dur="indefinite" restart="never" nodeType="tmRoot"/>
+      </p:par>
+    </p:tnLst>
+  </p:timing>
+</p:sld>
+</file>
+
+<file path=ppt/slides/slide12.xml><?xml version="1.0" encoding="utf-8"?>
+<p:sld xmlns:a="http://schemas.openxmlformats.org/drawingml/2006/main" xmlns:r="http://schemas.openxmlformats.org/officeDocument/2006/relationships" xmlns:p="http://schemas.openxmlformats.org/presentationml/2006/main">
+  <p:cSld>
+    <p:spTree>
+      <p:nvGrpSpPr>
+        <p:cNvPr id="1" name=""/>
+        <p:cNvGrpSpPr/>
+        <p:nvPr/>
+      </p:nvGrpSpPr>
+      <p:grpSpPr>
+        <a:xfrm>
+          <a:off x="0" y="0"/>
+          <a:ext cx="0" cy="0"/>
+          <a:chOff x="0" y="0"/>
+          <a:chExt cx="0" cy="0"/>
+        </a:xfrm>
+      </p:grpSpPr>
+      <p:sp>
+        <p:nvSpPr>
+          <p:cNvPr id="2" name="Content Placeholder 1"/>
+          <p:cNvSpPr>
+            <a:spLocks noGrp="1"/>
+          </p:cNvSpPr>
+          <p:nvPr>
+            <p:ph idx="1"/>
+          </p:nvPr>
+        </p:nvSpPr>
+        <p:spPr/>
+        <p:txBody>
+          <a:bodyPr/>
+          <a:lstStyle/>
+          <a:p>
+            <a:r>
+              <a:rPr lang="en-US" dirty="0" smtClean="0"/>
               <a:t>Grunt is a task runner for JavaScript, akin to Maven for Java</a:t>
             </a:r>
           </a:p>
@@ -4953,7 +5275,7 @@
 </p:sld>
 </file>
 
-<file path=ppt/slides/slide12.xml><?xml version="1.0" encoding="utf-8"?>
+<file path=ppt/slides/slide13.xml><?xml version="1.0" encoding="utf-8"?>
 <p:sld xmlns:a="http://schemas.openxmlformats.org/drawingml/2006/main" xmlns:r="http://schemas.openxmlformats.org/officeDocument/2006/relationships" xmlns:p="http://schemas.openxmlformats.org/presentationml/2006/main">
   <p:cSld>
     <p:spTree>
@@ -5322,25 +5644,30 @@
           <a:chExt cx="0" cy="0"/>
         </a:xfrm>
       </p:grpSpPr>
-      <p:sp>
-        <p:nvSpPr>
-          <p:cNvPr id="2" name="Content Placeholder 1"/>
-          <p:cNvSpPr>
-            <a:spLocks noGrp="1"/>
-          </p:cNvSpPr>
+      <p:pic>
+        <p:nvPicPr>
+          <p:cNvPr id="4" name="Content Placeholder 3"/>
+          <p:cNvPicPr>
+            <a:picLocks noGrp="1" noChangeAspect="1"/>
+          </p:cNvPicPr>
           <p:nvPr>
             <p:ph idx="1"/>
           </p:nvPr>
-        </p:nvSpPr>
-        <p:spPr/>
-        <p:txBody>
-          <a:bodyPr/>
-          <a:lstStyle/>
-          <a:p>
-            <a:endParaRPr lang="en-US"/>
-          </a:p>
-        </p:txBody>
-      </p:sp>
+        </p:nvPicPr>
+        <p:blipFill>
+          <a:blip r:embed="rId3"/>
+          <a:srcRect t="3750" b="3750"/>
+          <a:stretch>
+            <a:fillRect/>
+          </a:stretch>
+        </p:blipFill>
+        <p:spPr>
+          <a:xfrm>
+            <a:off x="757421" y="2085404"/>
+            <a:ext cx="7629159" cy="3999197"/>
+          </a:xfrm>
+        </p:spPr>
+      </p:pic>
       <p:sp>
         <p:nvSpPr>
           <p:cNvPr id="3" name="Title 2"/>
@@ -5403,6 +5730,67 @@
       </p:grpSpPr>
       <p:sp>
         <p:nvSpPr>
+          <p:cNvPr id="2" name="Content Placeholder 1"/>
+          <p:cNvSpPr>
+            <a:spLocks noGrp="1"/>
+          </p:cNvSpPr>
+          <p:nvPr>
+            <p:ph idx="1"/>
+          </p:nvPr>
+        </p:nvSpPr>
+        <p:spPr/>
+        <p:txBody>
+          <a:bodyPr/>
+          <a:lstStyle/>
+          <a:p>
+            <a:r>
+              <a:rPr lang="en-US" dirty="0" smtClean="0"/>
+              <a:t>Large-scale, greenfield initiative - ~100 engineers at full tilt</a:t>
+            </a:r>
+          </a:p>
+          <a:p>
+            <a:r>
+              <a:rPr lang="en-US" dirty="0" smtClean="0"/>
+              <a:t>Service oriented architecture – autonomous business components (ABC’s)</a:t>
+            </a:r>
+          </a:p>
+          <a:p>
+            <a:r>
+              <a:rPr lang="en-US" dirty="0" smtClean="0"/>
+              <a:t>Composition – data, service, or user interface – we favor UI</a:t>
+            </a:r>
+          </a:p>
+          <a:p>
+            <a:r>
+              <a:rPr lang="en-US" dirty="0" smtClean="0"/>
+              <a:t>Single page application is a complete app in HTML, CSS, and JavaScript</a:t>
+            </a:r>
+          </a:p>
+          <a:p>
+            <a:pPr lvl="1"/>
+            <a:r>
+              <a:rPr lang="en-US" dirty="0" smtClean="0"/>
+              <a:t>a single ‘page’ request</a:t>
+            </a:r>
+          </a:p>
+          <a:p>
+            <a:pPr lvl="1"/>
+            <a:r>
+              <a:rPr lang="en-US" dirty="0" smtClean="0"/>
+              <a:t>Templates on the client</a:t>
+            </a:r>
+          </a:p>
+          <a:p>
+            <a:pPr lvl="1"/>
+            <a:r>
+              <a:rPr lang="en-US" dirty="0" smtClean="0"/>
+              <a:t>Highly dynamic</a:t>
+            </a:r>
+          </a:p>
+        </p:txBody>
+      </p:sp>
+      <p:sp>
+        <p:nvSpPr>
           <p:cNvPr id="3" name="Title 2"/>
           <p:cNvSpPr>
             <a:spLocks noGrp="1"/>
@@ -5418,48 +5806,22 @@
           <a:p>
             <a:r>
               <a:rPr lang="en-US" dirty="0" smtClean="0"/>
-              <a:t>Bowling with bumpers</a:t>
+              <a:t>SINGLE PAGE APP ARCHITECTURE</a:t>
             </a:r>
             <a:endParaRPr lang="en-US" dirty="0"/>
-          </a:p>
-        </p:txBody>
-      </p:sp>
-      <p:sp>
-        <p:nvSpPr>
-          <p:cNvPr id="5" name="Content Placeholder 4"/>
-          <p:cNvSpPr>
-            <a:spLocks noGrp="1"/>
-          </p:cNvSpPr>
-          <p:nvPr>
-            <p:ph idx="1"/>
-          </p:nvPr>
-        </p:nvSpPr>
-        <p:spPr/>
-        <p:txBody>
-          <a:bodyPr/>
-          <a:lstStyle/>
-          <a:p>
-            <a:endParaRPr lang="en-US"/>
           </a:p>
         </p:txBody>
       </p:sp>
     </p:spTree>
     <p:extLst>
       <p:ext uri="{BB962C8B-B14F-4D97-AF65-F5344CB8AC3E}">
-        <p14:creationId xmlns:p14="http://schemas.microsoft.com/office/powerpoint/2010/main" val="1595921204"/>
+        <p14:creationId xmlns:p14="http://schemas.microsoft.com/office/powerpoint/2010/main" val="779678822"/>
       </p:ext>
     </p:extLst>
   </p:cSld>
   <p:clrMapOvr>
     <a:masterClrMapping/>
   </p:clrMapOvr>
-  <p:timing>
-    <p:tnLst>
-      <p:par>
-        <p:cTn xmlns:p14="http://schemas.microsoft.com/office/powerpoint/2010/main" id="1" dur="indefinite" restart="never" nodeType="tmRoot"/>
-      </p:par>
-    </p:tnLst>
-  </p:timing>
 </p:sld>
 </file>
 
@@ -5482,103 +5844,50 @@
       </p:grpSpPr>
       <p:sp>
         <p:nvSpPr>
-          <p:cNvPr id="2" name="Content Placeholder 1"/>
-          <p:cNvSpPr>
-            <a:spLocks noGrp="1"/>
-          </p:cNvSpPr>
+          <p:cNvPr id="3" name="Title 2"/>
+          <p:cNvSpPr>
+            <a:spLocks noGrp="1"/>
+          </p:cNvSpPr>
+          <p:nvPr>
+            <p:ph type="title"/>
+          </p:nvPr>
+        </p:nvSpPr>
+        <p:spPr/>
+        <p:txBody>
+          <a:bodyPr/>
+          <a:lstStyle/>
+          <a:p>
+            <a:r>
+              <a:rPr lang="en-US" dirty="0" smtClean="0"/>
+              <a:t>Bowling with bumpers</a:t>
+            </a:r>
+            <a:endParaRPr lang="en-US" dirty="0"/>
+          </a:p>
+        </p:txBody>
+      </p:sp>
+      <p:pic>
+        <p:nvPicPr>
+          <p:cNvPr id="6" name="Content Placeholder 5"/>
+          <p:cNvPicPr>
+            <a:picLocks noGrp="1" noChangeAspect="1"/>
+          </p:cNvPicPr>
           <p:nvPr>
             <p:ph idx="1"/>
           </p:nvPr>
-        </p:nvSpPr>
-        <p:spPr/>
-        <p:txBody>
-          <a:bodyPr/>
-          <a:lstStyle/>
-          <a:p>
-            <a:endParaRPr lang="en-US" dirty="0"/>
-          </a:p>
-        </p:txBody>
-      </p:sp>
-      <p:sp>
-        <p:nvSpPr>
-          <p:cNvPr id="3" name="Title 2"/>
-          <p:cNvSpPr>
-            <a:spLocks noGrp="1"/>
-          </p:cNvSpPr>
-          <p:nvPr>
-            <p:ph type="title"/>
-          </p:nvPr>
-        </p:nvSpPr>
-        <p:spPr/>
-        <p:txBody>
-          <a:bodyPr/>
-          <a:lstStyle/>
-          <a:p>
-            <a:r>
-              <a:rPr lang="en-US" dirty="0" smtClean="0"/>
-              <a:t>Black magic &amp; chicken wings</a:t>
-            </a:r>
-            <a:endParaRPr lang="en-US" dirty="0"/>
-          </a:p>
-        </p:txBody>
-      </p:sp>
-      <p:sp>
-        <p:nvSpPr>
-          <p:cNvPr id="4" name="TextBox 3"/>
-          <p:cNvSpPr txBox="1"/>
-          <p:nvPr/>
-        </p:nvSpPr>
-        <p:spPr>
-          <a:xfrm>
-            <a:off x="1418333" y="5417092"/>
-            <a:ext cx="6307335" cy="1077218"/>
-          </a:xfrm>
-          <a:prstGeom prst="rect">
-            <a:avLst/>
-          </a:prstGeom>
-        </p:spPr>
-        <p:style>
-          <a:lnRef idx="2">
-            <a:schemeClr val="accent6">
-              <a:shade val="50000"/>
-            </a:schemeClr>
-          </a:lnRef>
-          <a:fillRef idx="1">
-            <a:schemeClr val="accent6"/>
-          </a:fillRef>
-          <a:effectRef idx="0">
-            <a:schemeClr val="accent6"/>
-          </a:effectRef>
-          <a:fontRef idx="minor">
-            <a:schemeClr val="lt1"/>
-          </a:fontRef>
-        </p:style>
-        <p:txBody>
-          <a:bodyPr wrap="none" rtlCol="0">
-            <a:spAutoFit/>
-          </a:bodyPr>
-          <a:lstStyle/>
-          <a:p>
-            <a:pPr algn="ctr"/>
-            <a:r>
-              <a:rPr lang="en-US" sz="3200" i="1" dirty="0" smtClean="0"/>
-              <a:t>Less code - </a:t>
-            </a:r>
-          </a:p>
-          <a:p>
-            <a:pPr algn="ctr"/>
-            <a:r>
-              <a:rPr lang="en-US" sz="3200" i="1" dirty="0" smtClean="0"/>
-              <a:t>Easier to test &amp; More maintainable</a:t>
-            </a:r>
-            <a:endParaRPr lang="en-US" sz="3200" i="1" dirty="0"/>
-          </a:p>
-        </p:txBody>
-      </p:sp>
+        </p:nvPicPr>
+        <p:blipFill>
+          <a:blip r:embed="rId3"/>
+          <a:srcRect t="3338" b="3338"/>
+          <a:stretch>
+            <a:fillRect/>
+          </a:stretch>
+        </p:blipFill>
+        <p:spPr/>
+      </p:pic>
     </p:spTree>
     <p:extLst>
       <p:ext uri="{BB962C8B-B14F-4D97-AF65-F5344CB8AC3E}">
-        <p14:creationId xmlns:p14="http://schemas.microsoft.com/office/powerpoint/2010/main" val="3211319803"/>
+        <p14:creationId xmlns:p14="http://schemas.microsoft.com/office/powerpoint/2010/main" val="1595921204"/>
       </p:ext>
     </p:extLst>
   </p:cSld>
@@ -5612,6 +5921,144 @@
           <a:chExt cx="0" cy="0"/>
         </a:xfrm>
       </p:grpSpPr>
+      <p:sp>
+        <p:nvSpPr>
+          <p:cNvPr id="3" name="Title 2"/>
+          <p:cNvSpPr>
+            <a:spLocks noGrp="1"/>
+          </p:cNvSpPr>
+          <p:nvPr>
+            <p:ph type="title"/>
+          </p:nvPr>
+        </p:nvSpPr>
+        <p:spPr/>
+        <p:txBody>
+          <a:bodyPr/>
+          <a:lstStyle/>
+          <a:p>
+            <a:r>
+              <a:rPr lang="en-US" dirty="0" smtClean="0"/>
+              <a:t>Black magic &amp; chicken wings</a:t>
+            </a:r>
+            <a:endParaRPr lang="en-US" dirty="0"/>
+          </a:p>
+        </p:txBody>
+      </p:sp>
+      <p:pic>
+        <p:nvPicPr>
+          <p:cNvPr id="7" name="Content Placeholder 6"/>
+          <p:cNvPicPr>
+            <a:picLocks noGrp="1" noChangeAspect="1"/>
+          </p:cNvPicPr>
+          <p:nvPr>
+            <p:ph idx="1"/>
+          </p:nvPr>
+        </p:nvPicPr>
+        <p:blipFill>
+          <a:blip r:embed="rId3"/>
+          <a:srcRect t="10687" b="10687"/>
+          <a:stretch>
+            <a:fillRect/>
+          </a:stretch>
+        </p:blipFill>
+        <p:spPr>
+          <a:xfrm>
+            <a:off x="4733486" y="2618923"/>
+            <a:ext cx="4028774" cy="2111879"/>
+          </a:xfrm>
+        </p:spPr>
+      </p:pic>
+      <p:pic>
+        <p:nvPicPr>
+          <p:cNvPr id="8" name="Picture 7"/>
+          <p:cNvPicPr>
+            <a:picLocks noChangeAspect="1"/>
+          </p:cNvPicPr>
+          <p:nvPr/>
+        </p:nvPicPr>
+        <p:blipFill>
+          <a:blip r:embed="rId4"/>
+          <a:stretch>
+            <a:fillRect/>
+          </a:stretch>
+        </p:blipFill>
+        <p:spPr>
+          <a:xfrm>
+            <a:off x="381000" y="2618923"/>
+            <a:ext cx="3379007" cy="2111879"/>
+          </a:xfrm>
+          <a:prstGeom prst="rect">
+            <a:avLst/>
+          </a:prstGeom>
+        </p:spPr>
+      </p:pic>
+      <p:sp>
+        <p:nvSpPr>
+          <p:cNvPr id="9" name="TextBox 8"/>
+          <p:cNvSpPr txBox="1"/>
+          <p:nvPr/>
+        </p:nvSpPr>
+        <p:spPr>
+          <a:xfrm>
+            <a:off x="3991124" y="3234737"/>
+            <a:ext cx="590764" cy="923330"/>
+          </a:xfrm>
+          <a:prstGeom prst="rect">
+            <a:avLst/>
+          </a:prstGeom>
+          <a:noFill/>
+        </p:spPr>
+        <p:txBody>
+          <a:bodyPr wrap="none" rtlCol="0">
+            <a:spAutoFit/>
+          </a:bodyPr>
+          <a:lstStyle/>
+          <a:p>
+            <a:r>
+              <a:rPr lang="en-US" sz="5400" dirty="0" smtClean="0"/>
+              <a:t>+</a:t>
+            </a:r>
+            <a:endParaRPr lang="en-US" sz="5400" dirty="0"/>
+          </a:p>
+        </p:txBody>
+      </p:sp>
+    </p:spTree>
+    <p:extLst>
+      <p:ext uri="{BB962C8B-B14F-4D97-AF65-F5344CB8AC3E}">
+        <p14:creationId xmlns:p14="http://schemas.microsoft.com/office/powerpoint/2010/main" val="3211319803"/>
+      </p:ext>
+    </p:extLst>
+  </p:cSld>
+  <p:clrMapOvr>
+    <a:masterClrMapping/>
+  </p:clrMapOvr>
+  <p:timing>
+    <p:tnLst>
+      <p:par>
+        <p:cTn xmlns:p14="http://schemas.microsoft.com/office/powerpoint/2010/main" id="1" dur="indefinite" restart="never" nodeType="tmRoot"/>
+      </p:par>
+    </p:tnLst>
+  </p:timing>
+</p:sld>
+</file>
+
+<file path=ppt/slides/slide7.xml><?xml version="1.0" encoding="utf-8"?>
+<p:sld xmlns:a="http://schemas.openxmlformats.org/drawingml/2006/main" xmlns:r="http://schemas.openxmlformats.org/officeDocument/2006/relationships" xmlns:p="http://schemas.openxmlformats.org/presentationml/2006/main">
+  <p:cSld>
+    <p:spTree>
+      <p:nvGrpSpPr>
+        <p:cNvPr id="1" name=""/>
+        <p:cNvGrpSpPr/>
+        <p:nvPr/>
+      </p:nvGrpSpPr>
+      <p:grpSpPr>
+        <a:xfrm>
+          <a:off x="0" y="0"/>
+          <a:ext cx="0" cy="0"/>
+          <a:chOff x="0" y="0"/>
+          <a:chExt cx="0" cy="0"/>
+        </a:xfrm>
+      </p:grpSpPr>
       <p:graphicFrame>
         <p:nvGraphicFramePr>
           <p:cNvPr id="4" name="Content Placeholder 3"/>
@@ -5622,7 +6069,7 @@
             <p:ph idx="1"/>
             <p:extLst>
               <p:ext uri="{D42A27DB-BD31-4B8C-83A1-F6EECF244321}">
-                <p14:modId xmlns:p14="http://schemas.microsoft.com/office/powerpoint/2010/main" val="4241427103"/>
+                <p14:modId xmlns:p14="http://schemas.microsoft.com/office/powerpoint/2010/main" val="956921492"/>
               </p:ext>
             </p:extLst>
           </p:nvPr>
@@ -5665,7 +6112,7 @@
                       <a:pPr algn="ctr"/>
                       <a:r>
                         <a:rPr lang="en-US" sz="4000" dirty="0" smtClean="0"/>
-                        <a:t>Dependency Injection</a:t>
+                        <a:t>Directives</a:t>
                       </a:r>
                       <a:endParaRPr lang="en-US" sz="4000" dirty="0"/>
                     </a:p>
@@ -5679,12 +6126,27 @@
                     <a:bodyPr/>
                     <a:lstStyle/>
                     <a:p>
-                      <a:pPr algn="ctr"/>
+                      <a:pPr marL="0" marR="0" indent="0" algn="ctr" defTabSz="914400" rtl="0" eaLnBrk="1" fontAlgn="auto" latinLnBrk="0" hangingPunct="1">
+                        <a:lnSpc>
+                          <a:spcPct val="100000"/>
+                        </a:lnSpc>
+                        <a:spcBef>
+                          <a:spcPts val="0"/>
+                        </a:spcBef>
+                        <a:spcAft>
+                          <a:spcPts val="0"/>
+                        </a:spcAft>
+                        <a:buClrTx/>
+                        <a:buSzTx/>
+                        <a:buFontTx/>
+                        <a:buNone/>
+                        <a:tabLst/>
+                        <a:defRPr/>
+                      </a:pPr>
                       <a:r>
                         <a:rPr lang="en-US" sz="4000" dirty="0" smtClean="0"/>
-                        <a:t>Directives</a:t>
+                        <a:t>Dependency Injection</a:t>
                       </a:r>
-                      <a:endParaRPr lang="en-US" sz="4000" dirty="0"/>
                     </a:p>
                   </a:txBody>
                   <a:tcPr anchor="ctr"/>
@@ -5726,7 +6188,7 @@
           <a:p>
             <a:r>
               <a:rPr lang="en-US" dirty="0" smtClean="0"/>
-              <a:t>Four pillars</a:t>
+              <a:t>REASONS WE CHOSE ANGULARJS</a:t>
             </a:r>
             <a:endParaRPr lang="en-US" dirty="0"/>
           </a:p>
@@ -5736,154 +6198,6 @@
     <p:extLst>
       <p:ext uri="{BB962C8B-B14F-4D97-AF65-F5344CB8AC3E}">
         <p14:creationId xmlns:p14="http://schemas.microsoft.com/office/powerpoint/2010/main" val="1601897632"/>
-      </p:ext>
-    </p:extLst>
-  </p:cSld>
-  <p:clrMapOvr>
-    <a:masterClrMapping/>
-  </p:clrMapOvr>
-  <p:timing>
-    <p:tnLst>
-      <p:par>
-        <p:cTn xmlns:p14="http://schemas.microsoft.com/office/powerpoint/2010/main" id="1" dur="indefinite" restart="never" nodeType="tmRoot"/>
-      </p:par>
-    </p:tnLst>
-  </p:timing>
-</p:sld>
-</file>
-
-<file path=ppt/slides/slide7.xml><?xml version="1.0" encoding="utf-8"?>
-<p:sld xmlns:a="http://schemas.openxmlformats.org/drawingml/2006/main" xmlns:r="http://schemas.openxmlformats.org/officeDocument/2006/relationships" xmlns:p="http://schemas.openxmlformats.org/presentationml/2006/main">
-  <p:cSld>
-    <p:spTree>
-      <p:nvGrpSpPr>
-        <p:cNvPr id="1" name=""/>
-        <p:cNvGrpSpPr/>
-        <p:nvPr/>
-      </p:nvGrpSpPr>
-      <p:grpSpPr>
-        <a:xfrm>
-          <a:off x="0" y="0"/>
-          <a:ext cx="0" cy="0"/>
-          <a:chOff x="0" y="0"/>
-          <a:chExt cx="0" cy="0"/>
-        </a:xfrm>
-      </p:grpSpPr>
-      <p:sp>
-        <p:nvSpPr>
-          <p:cNvPr id="2" name="Content Placeholder 1"/>
-          <p:cNvSpPr>
-            <a:spLocks noGrp="1"/>
-          </p:cNvSpPr>
-          <p:nvPr>
-            <p:ph idx="1"/>
-          </p:nvPr>
-        </p:nvSpPr>
-        <p:spPr/>
-        <p:txBody>
-          <a:bodyPr/>
-          <a:lstStyle/>
-          <a:p>
-            <a:r>
-              <a:rPr lang="en-US" dirty="0" smtClean="0"/>
-              <a:t>Glue that binds the model with the view</a:t>
-            </a:r>
-          </a:p>
-          <a:p>
-            <a:r>
-              <a:rPr lang="en-US" dirty="0" smtClean="0"/>
-              <a:t>Decouple your application layers</a:t>
-            </a:r>
-          </a:p>
-          <a:p>
-            <a:r>
-              <a:rPr lang="en-US" dirty="0" smtClean="0"/>
-              <a:t>Model is the source of truth</a:t>
-            </a:r>
-            <a:endParaRPr lang="en-US" dirty="0"/>
-          </a:p>
-        </p:txBody>
-      </p:sp>
-      <p:sp>
-        <p:nvSpPr>
-          <p:cNvPr id="3" name="Title 2"/>
-          <p:cNvSpPr>
-            <a:spLocks noGrp="1"/>
-          </p:cNvSpPr>
-          <p:nvPr>
-            <p:ph type="title"/>
-          </p:nvPr>
-        </p:nvSpPr>
-        <p:spPr/>
-        <p:txBody>
-          <a:bodyPr/>
-          <a:lstStyle/>
-          <a:p>
-            <a:r>
-              <a:rPr lang="en-US" dirty="0" smtClean="0"/>
-              <a:t>Data binding</a:t>
-            </a:r>
-            <a:endParaRPr lang="en-US" dirty="0"/>
-          </a:p>
-        </p:txBody>
-      </p:sp>
-      <p:sp>
-        <p:nvSpPr>
-          <p:cNvPr id="4" name="TextBox 3"/>
-          <p:cNvSpPr txBox="1"/>
-          <p:nvPr/>
-        </p:nvSpPr>
-        <p:spPr>
-          <a:xfrm>
-            <a:off x="1418333" y="3658510"/>
-            <a:ext cx="6307335" cy="1077218"/>
-          </a:xfrm>
-          <a:prstGeom prst="rect">
-            <a:avLst/>
-          </a:prstGeom>
-        </p:spPr>
-        <p:style>
-          <a:lnRef idx="2">
-            <a:schemeClr val="accent6">
-              <a:shade val="50000"/>
-            </a:schemeClr>
-          </a:lnRef>
-          <a:fillRef idx="1">
-            <a:schemeClr val="accent6"/>
-          </a:fillRef>
-          <a:effectRef idx="0">
-            <a:schemeClr val="accent6"/>
-          </a:effectRef>
-          <a:fontRef idx="minor">
-            <a:schemeClr val="lt1"/>
-          </a:fontRef>
-        </p:style>
-        <p:txBody>
-          <a:bodyPr wrap="none" rtlCol="0">
-            <a:spAutoFit/>
-          </a:bodyPr>
-          <a:lstStyle/>
-          <a:p>
-            <a:pPr algn="ctr"/>
-            <a:r>
-              <a:rPr lang="en-US" sz="3200" i="1" dirty="0" smtClean="0"/>
-              <a:t>Less code - </a:t>
-            </a:r>
-          </a:p>
-          <a:p>
-            <a:pPr algn="ctr"/>
-            <a:r>
-              <a:rPr lang="en-US" sz="3200" i="1" dirty="0" smtClean="0"/>
-              <a:t>Easier to test &amp; More maintainable</a:t>
-            </a:r>
-            <a:endParaRPr lang="en-US" sz="3200" i="1" dirty="0"/>
-          </a:p>
-        </p:txBody>
-      </p:sp>
-    </p:spTree>
-    <p:extLst>
-      <p:ext uri="{BB962C8B-B14F-4D97-AF65-F5344CB8AC3E}">
-        <p14:creationId xmlns:p14="http://schemas.microsoft.com/office/powerpoint/2010/main" val="4191334459"/>
       </p:ext>
     </p:extLst>
   </p:cSld>
@@ -5934,22 +6248,26 @@
           <a:p>
             <a:r>
               <a:rPr lang="en-US" dirty="0" smtClean="0"/>
-              <a:t>Don’t call us, we’ll call you</a:t>
+              <a:t>Glue that binds the model with the view</a:t>
             </a:r>
           </a:p>
           <a:p>
             <a:r>
               <a:rPr lang="en-US" dirty="0" smtClean="0"/>
-              <a:t>Mock out dependencies for fast, clean unit tests</a:t>
+              <a:t>Changes to the model are immediately reflected in the view, and vice versa</a:t>
             </a:r>
           </a:p>
           <a:p>
             <a:r>
               <a:rPr lang="en-US" dirty="0" smtClean="0"/>
-              <a:t>Reduce unnecessary boilerplate object construction code</a:t>
-            </a:r>
-          </a:p>
-          <a:p>
+              <a:t>Decouple your application layers</a:t>
+            </a:r>
+          </a:p>
+          <a:p>
+            <a:r>
+              <a:rPr lang="en-US" dirty="0" smtClean="0"/>
+              <a:t>Model is the source of truth</a:t>
+            </a:r>
             <a:endParaRPr lang="en-US" dirty="0"/>
           </a:p>
         </p:txBody>
@@ -5971,7 +6289,7 @@
           <a:p>
             <a:r>
               <a:rPr lang="en-US" dirty="0" smtClean="0"/>
-              <a:t>Dependency Injection</a:t>
+              <a:t>Data binding</a:t>
             </a:r>
             <a:endParaRPr lang="en-US" dirty="0"/>
           </a:p>
@@ -5985,7 +6303,7 @@
         </p:nvSpPr>
         <p:spPr>
           <a:xfrm>
-            <a:off x="1418333" y="3658510"/>
+            <a:off x="1418333" y="4440102"/>
             <a:ext cx="6307335" cy="1077218"/>
           </a:xfrm>
           <a:prstGeom prst="rect">
@@ -6033,7 +6351,7 @@
     </p:spTree>
     <p:extLst>
       <p:ext uri="{BB962C8B-B14F-4D97-AF65-F5344CB8AC3E}">
-        <p14:creationId xmlns:p14="http://schemas.microsoft.com/office/powerpoint/2010/main" val="1193094378"/>
+        <p14:creationId xmlns:p14="http://schemas.microsoft.com/office/powerpoint/2010/main" val="4191334459"/>
       </p:ext>
     </p:extLst>
   </p:cSld>
@@ -6084,7 +6402,7 @@
           <a:p>
             <a:r>
               <a:rPr lang="en-US" dirty="0" smtClean="0"/>
-              <a:t>Ability to teach HTML new tricks</a:t>
+              <a:t>Ability to teach HTML new tricks with custom DSL’s</a:t>
             </a:r>
           </a:p>
           <a:p>
@@ -6098,15 +6416,6 @@
               <a:rPr lang="en-US" dirty="0" smtClean="0"/>
               <a:t>Separation of directive template from code enables testability</a:t>
             </a:r>
-          </a:p>
-          <a:p>
-            <a:r>
-              <a:rPr lang="en-US" dirty="0" smtClean="0"/>
-              <a:t>A directive can be element, attribute, CSS class, or comment</a:t>
-            </a:r>
-          </a:p>
-          <a:p>
-            <a:endParaRPr lang="en-US" dirty="0"/>
           </a:p>
         </p:txBody>
       </p:sp>
@@ -6141,7 +6450,7 @@
         </p:nvSpPr>
         <p:spPr>
           <a:xfrm>
-            <a:off x="1418333" y="3658510"/>
+            <a:off x="1418333" y="4105134"/>
             <a:ext cx="6307335" cy="1077218"/>
           </a:xfrm>
           <a:prstGeom prst="rect">

</xml_diff>

<commit_message>
Cleaning up some slides
</commit_message>
<xml_diff>
--- a/angularjs-meetup-portland.pptx
+++ b/angularjs-meetup-portland.pptx
@@ -10,17 +10,17 @@
   <p:sldIdLst>
     <p:sldId id="256" r:id="rId2"/>
     <p:sldId id="261" r:id="rId3"/>
-    <p:sldId id="268" r:id="rId4"/>
-    <p:sldId id="269" r:id="rId5"/>
-    <p:sldId id="259" r:id="rId6"/>
-    <p:sldId id="258" r:id="rId7"/>
-    <p:sldId id="260" r:id="rId8"/>
-    <p:sldId id="262" r:id="rId9"/>
-    <p:sldId id="264" r:id="rId10"/>
-    <p:sldId id="263" r:id="rId11"/>
-    <p:sldId id="265" r:id="rId12"/>
-    <p:sldId id="266" r:id="rId13"/>
-    <p:sldId id="267" r:id="rId14"/>
+    <p:sldId id="269" r:id="rId4"/>
+    <p:sldId id="259" r:id="rId5"/>
+    <p:sldId id="258" r:id="rId6"/>
+    <p:sldId id="260" r:id="rId7"/>
+    <p:sldId id="262" r:id="rId8"/>
+    <p:sldId id="264" r:id="rId9"/>
+    <p:sldId id="263" r:id="rId10"/>
+    <p:sldId id="265" r:id="rId11"/>
+    <p:sldId id="266" r:id="rId12"/>
+    <p:sldId id="267" r:id="rId13"/>
+    <p:sldId id="270" r:id="rId14"/>
   </p:sldIdLst>
   <p:sldSz cx="9144000" cy="6858000" type="screen4x3"/>
   <p:notesSz cx="6858000" cy="9144000"/>
@@ -600,35 +600,7 @@
           <a:bodyPr/>
           <a:lstStyle/>
           <a:p>
-            <a:r>
-              <a:rPr lang="en-US" dirty="0" smtClean="0"/>
-              <a:t>-Engineering director at ADP responsible for Core Services and</a:t>
-            </a:r>
-            <a:r>
-              <a:rPr lang="en-US" baseline="0" dirty="0" smtClean="0"/>
-              <a:t> Continuous Delivery of a large, green </a:t>
-            </a:r>
-            <a:r>
-              <a:rPr lang="en-US" baseline="0" smtClean="0"/>
-              <a:t>field application</a:t>
-            </a:r>
-            <a:endParaRPr lang="en-US" dirty="0" smtClean="0"/>
-          </a:p>
-          <a:p>
-            <a:r>
-              <a:rPr lang="en-US" dirty="0" smtClean="0"/>
-              <a:t>-Prior to ADP, owned a startup focused</a:t>
-            </a:r>
-            <a:r>
-              <a:rPr lang="en-US" baseline="0" dirty="0" smtClean="0"/>
-              <a:t> on IP video solutions</a:t>
-            </a:r>
-          </a:p>
-          <a:p>
-            <a:r>
-              <a:rPr lang="en-US" baseline="0" dirty="0" smtClean="0"/>
-              <a:t>-Polyglot programmer with experience in C#, Java, JavaScript, Perl, Objective-C, and others</a:t>
-            </a:r>
+            <a:endParaRPr lang="en-US" baseline="0" dirty="0" smtClean="0"/>
           </a:p>
         </p:txBody>
       </p:sp>
@@ -649,7 +621,7 @@
           <a:p>
             <a:fld id="{A386C675-DD47-B74C-ABE9-0ED036F1B65F}" type="slidenum">
               <a:rPr lang="en-US" smtClean="0"/>
-              <a:t>3</a:t>
+              <a:t>4</a:t>
             </a:fld>
             <a:endParaRPr lang="en-US"/>
           </a:p>
@@ -658,7 +630,7 @@
     </p:spTree>
     <p:extLst>
       <p:ext uri="{BB962C8B-B14F-4D97-AF65-F5344CB8AC3E}">
-        <p14:creationId xmlns:p14="http://schemas.microsoft.com/office/powerpoint/2010/main" val="3236759061"/>
+        <p14:creationId xmlns:p14="http://schemas.microsoft.com/office/powerpoint/2010/main" val="1622205514"/>
       </p:ext>
     </p:extLst>
   </p:cSld>
@@ -712,111 +684,7 @@
           <a:bodyPr/>
           <a:lstStyle/>
           <a:p>
-            <a:r>
-              <a:rPr lang="en-US" dirty="0" smtClean="0"/>
-              <a:t>-Always been easy</a:t>
-            </a:r>
-            <a:r>
-              <a:rPr lang="en-US" baseline="0" dirty="0" smtClean="0"/>
-              <a:t> to not adhere to good engineering principles when using JavaScript</a:t>
-            </a:r>
-          </a:p>
-          <a:p>
-            <a:r>
-              <a:rPr lang="en-US" baseline="0" dirty="0" smtClean="0"/>
-              <a:t>-on a large scale, enterprise application, we needed a way to allow engineers autonomy, but not color outside of the lines</a:t>
-            </a:r>
-          </a:p>
-          <a:p>
-            <a:r>
-              <a:rPr lang="en-US" baseline="0" dirty="0" smtClean="0"/>
-              <a:t>-library </a:t>
-            </a:r>
-            <a:r>
-              <a:rPr lang="en-US" baseline="0" dirty="0" err="1" smtClean="0"/>
-              <a:t>vs</a:t>
-            </a:r>
-            <a:r>
-              <a:rPr lang="en-US" baseline="0" dirty="0" smtClean="0"/>
-              <a:t> framework</a:t>
-            </a:r>
-          </a:p>
-          <a:p>
-            <a:r>
-              <a:rPr lang="en-US" baseline="0" dirty="0" smtClean="0"/>
-              <a:t>	-you call a library, can abstract and swap them out, typically serve a narrow purpose</a:t>
-            </a:r>
-          </a:p>
-          <a:p>
-            <a:r>
-              <a:rPr lang="en-US" baseline="0" dirty="0" smtClean="0"/>
-              <a:t>	-develop into a framework, it is weaved throughout your application, harder to migrate away from (Spring is an example)</a:t>
-            </a:r>
-          </a:p>
-          <a:p>
-            <a:r>
-              <a:rPr lang="en-US" baseline="0" dirty="0" smtClean="0"/>
-              <a:t>	-</a:t>
-            </a:r>
-            <a:r>
-              <a:rPr lang="en-US" baseline="0" dirty="0" err="1" smtClean="0"/>
-              <a:t>CanJS</a:t>
-            </a:r>
-            <a:r>
-              <a:rPr lang="en-US" baseline="0" dirty="0" smtClean="0"/>
-              <a:t> &amp; </a:t>
-            </a:r>
-            <a:r>
-              <a:rPr lang="en-US" baseline="0" dirty="0" err="1" smtClean="0"/>
-              <a:t>KnockoutJS</a:t>
-            </a:r>
-            <a:r>
-              <a:rPr lang="en-US" baseline="0" dirty="0" smtClean="0"/>
-              <a:t> are libraries</a:t>
-            </a:r>
-          </a:p>
-          <a:p>
-            <a:r>
-              <a:rPr lang="en-US" baseline="0" dirty="0" smtClean="0"/>
-              <a:t>	-</a:t>
-            </a:r>
-            <a:r>
-              <a:rPr lang="en-US" baseline="0" dirty="0" err="1" smtClean="0"/>
-              <a:t>EmberJS</a:t>
-            </a:r>
-            <a:r>
-              <a:rPr lang="en-US" baseline="0" dirty="0" smtClean="0"/>
-              <a:t> is an extremely opinionated framework</a:t>
-            </a:r>
-          </a:p>
-          <a:p>
-            <a:r>
-              <a:rPr lang="en-US" baseline="0" dirty="0" smtClean="0"/>
-              <a:t>-Angular is a framework, not so opinionated</a:t>
-            </a:r>
-          </a:p>
-          <a:p>
-            <a:r>
-              <a:rPr lang="en-US" baseline="0" dirty="0" smtClean="0"/>
-              <a:t>	-you can use it on just part of a page</a:t>
-            </a:r>
-          </a:p>
-          <a:p>
-            <a:r>
-              <a:rPr lang="en-US" baseline="0" dirty="0" smtClean="0"/>
-              <a:t>	-directory structure is not defined for you</a:t>
-            </a:r>
-          </a:p>
-          <a:p>
-            <a:r>
-              <a:rPr lang="en-US" baseline="0" dirty="0" smtClean="0"/>
-              <a:t>	-conventions exist for stereotypes such as Controller, Service, </a:t>
-            </a:r>
-            <a:r>
-              <a:rPr lang="en-US" baseline="0" dirty="0" err="1" smtClean="0"/>
-              <a:t>etc</a:t>
-            </a:r>
-            <a:endParaRPr lang="en-US" baseline="0" dirty="0" smtClean="0"/>
+            <a:endParaRPr lang="en-US" dirty="0"/>
           </a:p>
         </p:txBody>
       </p:sp>
@@ -838,133 +706,6 @@
             <a:fld id="{A386C675-DD47-B74C-ABE9-0ED036F1B65F}" type="slidenum">
               <a:rPr lang="en-US" smtClean="0"/>
               <a:t>5</a:t>
-            </a:fld>
-            <a:endParaRPr lang="en-US"/>
-          </a:p>
-        </p:txBody>
-      </p:sp>
-    </p:spTree>
-    <p:extLst>
-      <p:ext uri="{BB962C8B-B14F-4D97-AF65-F5344CB8AC3E}">
-        <p14:creationId xmlns:p14="http://schemas.microsoft.com/office/powerpoint/2010/main" val="1622205514"/>
-      </p:ext>
-    </p:extLst>
-  </p:cSld>
-  <p:clrMapOvr>
-    <a:masterClrMapping/>
-  </p:clrMapOvr>
-</p:notes>
-</file>
-
-<file path=ppt/notesSlides/notesSlide4.xml><?xml version="1.0" encoding="utf-8"?>
-<p:notes xmlns:a="http://schemas.openxmlformats.org/drawingml/2006/main" xmlns:r="http://schemas.openxmlformats.org/officeDocument/2006/relationships" xmlns:p="http://schemas.openxmlformats.org/presentationml/2006/main">
-  <p:cSld>
-    <p:spTree>
-      <p:nvGrpSpPr>
-        <p:cNvPr id="1" name=""/>
-        <p:cNvGrpSpPr/>
-        <p:nvPr/>
-      </p:nvGrpSpPr>
-      <p:grpSpPr>
-        <a:xfrm>
-          <a:off x="0" y="0"/>
-          <a:ext cx="0" cy="0"/>
-          <a:chOff x="0" y="0"/>
-          <a:chExt cx="0" cy="0"/>
-        </a:xfrm>
-      </p:grpSpPr>
-      <p:sp>
-        <p:nvSpPr>
-          <p:cNvPr id="2" name="Slide Image Placeholder 1"/>
-          <p:cNvSpPr>
-            <a:spLocks noGrp="1" noRot="1" noChangeAspect="1"/>
-          </p:cNvSpPr>
-          <p:nvPr>
-            <p:ph type="sldImg"/>
-          </p:nvPr>
-        </p:nvSpPr>
-        <p:spPr/>
-      </p:sp>
-      <p:sp>
-        <p:nvSpPr>
-          <p:cNvPr id="3" name="Notes Placeholder 2"/>
-          <p:cNvSpPr>
-            <a:spLocks noGrp="1"/>
-          </p:cNvSpPr>
-          <p:nvPr>
-            <p:ph type="body" idx="1"/>
-          </p:nvPr>
-        </p:nvSpPr>
-        <p:spPr/>
-        <p:txBody>
-          <a:bodyPr/>
-          <a:lstStyle/>
-          <a:p>
-            <a:r>
-              <a:rPr lang="en-US" dirty="0" smtClean="0"/>
-              <a:t>-Tell</a:t>
-            </a:r>
-            <a:r>
-              <a:rPr lang="en-US" baseline="0" dirty="0" smtClean="0"/>
-              <a:t> story about the first time </a:t>
-            </a:r>
-            <a:r>
-              <a:rPr lang="en-US" baseline="0" dirty="0" err="1" smtClean="0"/>
-              <a:t>Elbrader</a:t>
-            </a:r>
-            <a:r>
-              <a:rPr lang="en-US" baseline="0" dirty="0" smtClean="0"/>
-              <a:t> used this term</a:t>
-            </a:r>
-          </a:p>
-          <a:p>
-            <a:r>
-              <a:rPr lang="en-US" baseline="0" dirty="0" smtClean="0"/>
-              <a:t>-Angular does a lot of magic behind the scenes – promises, data binding, template interpolation, location/deep linking, logging</a:t>
-            </a:r>
-            <a:endParaRPr lang="en-US" dirty="0" smtClean="0"/>
-          </a:p>
-          <a:p>
-            <a:r>
-              <a:rPr lang="en-US" dirty="0" smtClean="0"/>
-              <a:t>-Bottom line:</a:t>
-            </a:r>
-            <a:r>
-              <a:rPr lang="en-US" baseline="0" dirty="0" smtClean="0"/>
-              <a:t> </a:t>
-            </a:r>
-            <a:r>
-              <a:rPr lang="en-US" dirty="0" smtClean="0"/>
-              <a:t>Less code</a:t>
-            </a:r>
-            <a:r>
-              <a:rPr lang="en-US" baseline="0" dirty="0" smtClean="0"/>
-              <a:t> – easier to test &amp; more maintainable</a:t>
-            </a:r>
-          </a:p>
-          <a:p>
-            <a:endParaRPr lang="en-US" dirty="0"/>
-          </a:p>
-        </p:txBody>
-      </p:sp>
-      <p:sp>
-        <p:nvSpPr>
-          <p:cNvPr id="4" name="Slide Number Placeholder 3"/>
-          <p:cNvSpPr>
-            <a:spLocks noGrp="1"/>
-          </p:cNvSpPr>
-          <p:nvPr>
-            <p:ph type="sldNum" sz="quarter" idx="10"/>
-          </p:nvPr>
-        </p:nvSpPr>
-        <p:spPr/>
-        <p:txBody>
-          <a:bodyPr/>
-          <a:lstStyle/>
-          <a:p>
-            <a:fld id="{A386C675-DD47-B74C-ABE9-0ED036F1B65F}" type="slidenum">
-              <a:rPr lang="en-US" smtClean="0"/>
-              <a:t>6</a:t>
             </a:fld>
             <a:endParaRPr lang="en-US"/>
           </a:p>
@@ -4823,23 +4564,26 @@
           <a:p>
             <a:r>
               <a:rPr lang="en-US" dirty="0" smtClean="0"/>
-              <a:t>Don’t call us, we’ll call you</a:t>
+              <a:t>A built-in framework to mock modules</a:t>
             </a:r>
           </a:p>
           <a:p>
             <a:r>
               <a:rPr lang="en-US" dirty="0" smtClean="0"/>
-              <a:t>Mock dependencies for fast, clean unit tests</a:t>
+              <a:t>Provides a test runner (Karma)</a:t>
             </a:r>
           </a:p>
           <a:p>
             <a:r>
               <a:rPr lang="en-US" dirty="0" smtClean="0"/>
-              <a:t>Reduce unnecessary, boilerplate object construction code</a:t>
-            </a:r>
-          </a:p>
-          <a:p>
-            <a:endParaRPr lang="en-US" dirty="0"/>
+              <a:t>Dependency injection creates the seams for mocks, spies</a:t>
+            </a:r>
+          </a:p>
+          <a:p>
+            <a:r>
+              <a:rPr lang="en-US" dirty="0" smtClean="0"/>
+              <a:t>Built-in support for mocking HTTP back-ends</a:t>
+            </a:r>
           </a:p>
         </p:txBody>
       </p:sp>
@@ -4860,7 +4604,7 @@
           <a:p>
             <a:r>
               <a:rPr lang="en-US" dirty="0" smtClean="0"/>
-              <a:t>Dependency Injection</a:t>
+              <a:t>Testability</a:t>
             </a:r>
             <a:endParaRPr lang="en-US" dirty="0"/>
           </a:p>
@@ -4922,7 +4666,7 @@
     </p:spTree>
     <p:extLst>
       <p:ext uri="{BB962C8B-B14F-4D97-AF65-F5344CB8AC3E}">
-        <p14:creationId xmlns:p14="http://schemas.microsoft.com/office/powerpoint/2010/main" val="1193094378"/>
+        <p14:creationId xmlns:p14="http://schemas.microsoft.com/office/powerpoint/2010/main" val="401550413"/>
       </p:ext>
     </p:extLst>
   </p:cSld>
@@ -4973,26 +4717,56 @@
           <a:p>
             <a:r>
               <a:rPr lang="en-US" dirty="0" smtClean="0"/>
-              <a:t>A built-in framework to mock modules</a:t>
+              <a:t>Grunt is a task runner for JavaScript, akin to Maven for Java</a:t>
             </a:r>
           </a:p>
           <a:p>
             <a:r>
               <a:rPr lang="en-US" dirty="0" smtClean="0"/>
-              <a:t>Provides a test runner (Karma)</a:t>
+              <a:t>Enables a smooth developer workflow</a:t>
             </a:r>
           </a:p>
           <a:p>
             <a:r>
               <a:rPr lang="en-US" dirty="0" smtClean="0"/>
-              <a:t>Dependency injection creates the seams for mocks, spies</a:t>
-            </a:r>
+              <a:t>Runs on </a:t>
+            </a:r>
+            <a:r>
+              <a:rPr lang="en-US" dirty="0" err="1" smtClean="0"/>
+              <a:t>NodeJS</a:t>
+            </a:r>
+            <a:endParaRPr lang="en-US" dirty="0" smtClean="0"/>
           </a:p>
           <a:p>
             <a:r>
               <a:rPr lang="en-US" dirty="0" smtClean="0"/>
-              <a:t>Built-in support for mocking HTTP back-ends</a:t>
-            </a:r>
+              <a:t>Common tasks for unit testing, </a:t>
+            </a:r>
+            <a:r>
+              <a:rPr lang="en-US" dirty="0" err="1" smtClean="0"/>
+              <a:t>linting</a:t>
+            </a:r>
+            <a:r>
+              <a:rPr lang="en-US" dirty="0" smtClean="0"/>
+              <a:t>, concatenation, </a:t>
+            </a:r>
+            <a:r>
+              <a:rPr lang="en-US" dirty="0" err="1" smtClean="0"/>
+              <a:t>minification</a:t>
+            </a:r>
+            <a:r>
+              <a:rPr lang="en-US" dirty="0" smtClean="0"/>
+              <a:t>, LESS/SASS compilation, template caching, and running a local </a:t>
+            </a:r>
+            <a:r>
+              <a:rPr lang="en-US" dirty="0" err="1" smtClean="0"/>
+              <a:t>dev</a:t>
+            </a:r>
+            <a:r>
+              <a:rPr lang="en-US" dirty="0" smtClean="0"/>
+              <a:t> server</a:t>
+            </a:r>
+            <a:endParaRPr lang="en-US" dirty="0"/>
           </a:p>
         </p:txBody>
       </p:sp>
@@ -5013,7 +4787,7 @@
           <a:p>
             <a:r>
               <a:rPr lang="en-US" dirty="0" smtClean="0"/>
-              <a:t>Testability</a:t>
+              <a:t>grunt</a:t>
             </a:r>
             <a:endParaRPr lang="en-US" dirty="0"/>
           </a:p>
@@ -5027,7 +4801,7 @@
         </p:nvSpPr>
         <p:spPr>
           <a:xfrm>
-            <a:off x="1418333" y="3658510"/>
+            <a:off x="1418333" y="4593629"/>
             <a:ext cx="6307335" cy="1077218"/>
           </a:xfrm>
           <a:prstGeom prst="rect">
@@ -5075,7 +4849,7 @@
     </p:spTree>
     <p:extLst>
       <p:ext uri="{BB962C8B-B14F-4D97-AF65-F5344CB8AC3E}">
-        <p14:creationId xmlns:p14="http://schemas.microsoft.com/office/powerpoint/2010/main" val="401550413"/>
+        <p14:creationId xmlns:p14="http://schemas.microsoft.com/office/powerpoint/2010/main" val="2667311554"/>
       </p:ext>
     </p:extLst>
   </p:cSld>
@@ -5121,144 +4895,162 @@
         </p:nvSpPr>
         <p:spPr/>
         <p:txBody>
-          <a:bodyPr/>
-          <a:lstStyle/>
+          <a:bodyPr>
+            <a:normAutofit/>
+          </a:bodyPr>
+          <a:lstStyle/>
+          <a:p>
+            <a:r>
+              <a:rPr lang="en-US" dirty="0"/>
+              <a:t>Check out the videos on AngularJS YouTube page at </a:t>
+            </a:r>
+            <a:r>
+              <a:rPr lang="en-US" dirty="0">
+                <a:hlinkClick r:id="rId2"/>
+              </a:rPr>
+              <a:t>http://youtube.com/angularjs</a:t>
+            </a:r>
+            <a:r>
+              <a:rPr lang="en-US" dirty="0"/>
+              <a:t> </a:t>
+            </a:r>
+          </a:p>
           <a:p>
             <a:r>
               <a:rPr lang="en-US" dirty="0" smtClean="0"/>
-              <a:t>Grunt is a task runner for JavaScript, akin to Maven for Java</a:t>
-            </a:r>
+              <a:t>Watch John Lindquist’s videos at </a:t>
+            </a:r>
+            <a:r>
+              <a:rPr lang="en-US" dirty="0" smtClean="0">
+                <a:hlinkClick r:id="rId3"/>
+              </a:rPr>
+              <a:t>http://egghead.io</a:t>
+            </a:r>
+            <a:endParaRPr lang="en-US" dirty="0" smtClean="0"/>
           </a:p>
           <a:p>
             <a:r>
               <a:rPr lang="en-US" dirty="0" smtClean="0"/>
-              <a:t>Enables a smooth developer workflow</a:t>
-            </a:r>
-          </a:p>
-          <a:p>
+              <a:t>Use Grunt – clone angular</a:t>
+            </a:r>
+            <a:r>
+              <a:rPr lang="en-US" dirty="0"/>
+              <a:t>-grunt-seed project from </a:t>
+            </a:r>
+            <a:r>
+              <a:rPr lang="en-US" dirty="0" err="1"/>
+              <a:t>Srinivas</a:t>
+            </a:r>
+            <a:r>
+              <a:rPr lang="en-US" dirty="0"/>
+              <a:t> </a:t>
+            </a:r>
+            <a:r>
+              <a:rPr lang="en-US" dirty="0" err="1"/>
+              <a:t>Kusunam</a:t>
+            </a:r>
+            <a:r>
+              <a:rPr lang="en-US" dirty="0"/>
+              <a:t> (architect @ ADP DS</a:t>
+            </a:r>
             <a:r>
               <a:rPr lang="en-US" dirty="0" smtClean="0"/>
-              <a:t>Runs on </a:t>
+              <a:t>) at  </a:t>
+            </a:r>
+            <a:r>
+              <a:rPr lang="en-US" dirty="0">
+                <a:hlinkClick r:id="rId4"/>
+              </a:rPr>
+              <a:t>http://github.com/skusunam/angular-grunt-seed</a:t>
+            </a:r>
+            <a:endParaRPr lang="en-US" dirty="0"/>
+          </a:p>
+          <a:p>
+            <a:r>
+              <a:rPr lang="en-US" dirty="0" smtClean="0"/>
+              <a:t>Test, test, test – use Jasmine </a:t>
+            </a:r>
+            <a:r>
+              <a:rPr lang="en-US" dirty="0"/>
+              <a:t>for BDD at </a:t>
+            </a:r>
+            <a:r>
+              <a:rPr lang="en-US" dirty="0">
+                <a:hlinkClick r:id="rId5"/>
+              </a:rPr>
+              <a:t>https://github.com/pivotal/jasmine</a:t>
+            </a:r>
+            <a:r>
+              <a:rPr lang="en-US" dirty="0" smtClean="0">
+                <a:hlinkClick r:id="rId5"/>
+              </a:rPr>
+              <a:t>/</a:t>
+            </a:r>
+            <a:r>
+              <a:rPr lang="en-US" dirty="0" smtClean="0"/>
+              <a:t> </a:t>
+            </a:r>
+          </a:p>
+          <a:p>
+            <a:r>
+              <a:rPr lang="en-US" dirty="0" smtClean="0"/>
+              <a:t>$provide - Understand Providers, Services, Factories, Values, Constants, </a:t>
             </a:r>
             <a:r>
               <a:rPr lang="en-US" dirty="0" err="1" smtClean="0"/>
-              <a:t>NodeJS</a:t>
+              <a:t>etc</a:t>
             </a:r>
             <a:endParaRPr lang="en-US" dirty="0" smtClean="0"/>
           </a:p>
           <a:p>
             <a:r>
               <a:rPr lang="en-US" dirty="0" smtClean="0"/>
-              <a:t>Common tasks for unit testing, </a:t>
+              <a:t>Fight the urge to manipulate the DOM (with </a:t>
             </a:r>
             <a:r>
               <a:rPr lang="en-US" dirty="0" err="1" smtClean="0"/>
-              <a:t>linting</a:t>
+              <a:t>jQuery</a:t>
             </a:r>
             <a:r>
               <a:rPr lang="en-US" dirty="0" smtClean="0"/>
-              <a:t>, concatenation, </a:t>
-            </a:r>
-            <a:r>
-              <a:rPr lang="en-US" dirty="0" err="1" smtClean="0"/>
-              <a:t>minification</a:t>
-            </a:r>
+              <a:t>)</a:t>
+            </a:r>
+          </a:p>
+          <a:p>
             <a:r>
               <a:rPr lang="en-US" dirty="0" smtClean="0"/>
-              <a:t>, LESS/SASS compilation, template caching, and running a local </a:t>
-            </a:r>
-            <a:r>
-              <a:rPr lang="en-US" dirty="0" err="1" smtClean="0"/>
-              <a:t>dev</a:t>
-            </a:r>
+              <a:t>Get involved and contribute</a:t>
+            </a:r>
+          </a:p>
+        </p:txBody>
+      </p:sp>
+      <p:sp>
+        <p:nvSpPr>
+          <p:cNvPr id="3" name="Title 2"/>
+          <p:cNvSpPr>
+            <a:spLocks noGrp="1"/>
+          </p:cNvSpPr>
+          <p:nvPr>
+            <p:ph type="title"/>
+          </p:nvPr>
+        </p:nvSpPr>
+        <p:spPr/>
+        <p:txBody>
+          <a:bodyPr/>
+          <a:lstStyle/>
+          <a:p>
             <a:r>
               <a:rPr lang="en-US" dirty="0" smtClean="0"/>
-              <a:t> server</a:t>
+              <a:t>ADVICE</a:t>
             </a:r>
             <a:endParaRPr lang="en-US" dirty="0"/>
-          </a:p>
-        </p:txBody>
-      </p:sp>
-      <p:sp>
-        <p:nvSpPr>
-          <p:cNvPr id="3" name="Title 2"/>
-          <p:cNvSpPr>
-            <a:spLocks noGrp="1"/>
-          </p:cNvSpPr>
-          <p:nvPr>
-            <p:ph type="title"/>
-          </p:nvPr>
-        </p:nvSpPr>
-        <p:spPr/>
-        <p:txBody>
-          <a:bodyPr/>
-          <a:lstStyle/>
-          <a:p>
-            <a:r>
-              <a:rPr lang="en-US" dirty="0" smtClean="0"/>
-              <a:t>grunt</a:t>
-            </a:r>
-            <a:endParaRPr lang="en-US" dirty="0"/>
-          </a:p>
-        </p:txBody>
-      </p:sp>
-      <p:sp>
-        <p:nvSpPr>
-          <p:cNvPr id="4" name="TextBox 3"/>
-          <p:cNvSpPr txBox="1"/>
-          <p:nvPr/>
-        </p:nvSpPr>
-        <p:spPr>
-          <a:xfrm>
-            <a:off x="1418333" y="4593629"/>
-            <a:ext cx="6307335" cy="1077218"/>
-          </a:xfrm>
-          <a:prstGeom prst="rect">
-            <a:avLst/>
-          </a:prstGeom>
-        </p:spPr>
-        <p:style>
-          <a:lnRef idx="2">
-            <a:schemeClr val="accent6">
-              <a:shade val="50000"/>
-            </a:schemeClr>
-          </a:lnRef>
-          <a:fillRef idx="1">
-            <a:schemeClr val="accent6"/>
-          </a:fillRef>
-          <a:effectRef idx="0">
-            <a:schemeClr val="accent6"/>
-          </a:effectRef>
-          <a:fontRef idx="minor">
-            <a:schemeClr val="lt1"/>
-          </a:fontRef>
-        </p:style>
-        <p:txBody>
-          <a:bodyPr wrap="none" rtlCol="0">
-            <a:spAutoFit/>
-          </a:bodyPr>
-          <a:lstStyle/>
-          <a:p>
-            <a:pPr algn="ctr"/>
-            <a:r>
-              <a:rPr lang="en-US" sz="3200" i="1" dirty="0" smtClean="0"/>
-              <a:t>Less code - </a:t>
-            </a:r>
-          </a:p>
-          <a:p>
-            <a:pPr algn="ctr"/>
-            <a:r>
-              <a:rPr lang="en-US" sz="3200" i="1" dirty="0" smtClean="0"/>
-              <a:t>Easier to test &amp; More maintainable</a:t>
-            </a:r>
-            <a:endParaRPr lang="en-US" sz="3200" i="1" dirty="0"/>
           </a:p>
         </p:txBody>
       </p:sp>
     </p:spTree>
     <p:extLst>
       <p:ext uri="{BB962C8B-B14F-4D97-AF65-F5344CB8AC3E}">
-        <p14:creationId xmlns:p14="http://schemas.microsoft.com/office/powerpoint/2010/main" val="2667311554"/>
+        <p14:creationId xmlns:p14="http://schemas.microsoft.com/office/powerpoint/2010/main" val="86815791"/>
       </p:ext>
     </p:extLst>
   </p:cSld>
@@ -5304,153 +5096,74 @@
         </p:nvSpPr>
         <p:spPr/>
         <p:txBody>
-          <a:bodyPr>
-            <a:normAutofit/>
-          </a:bodyPr>
-          <a:lstStyle/>
+          <a:bodyPr/>
+          <a:lstStyle/>
+          <a:p>
+            <a:r>
+              <a:rPr lang="en-US" dirty="0" smtClean="0"/>
+              <a:t>@</a:t>
+            </a:r>
+            <a:r>
+              <a:rPr lang="en-US" dirty="0" err="1" smtClean="0"/>
+              <a:t>BrianGarofola</a:t>
+            </a:r>
+            <a:endParaRPr lang="en-US" dirty="0" smtClean="0"/>
+          </a:p>
           <a:p>
             <a:r>
               <a:rPr lang="en-US" dirty="0"/>
-              <a:t>Check out the videos on AngularJS YouTube page at </a:t>
-            </a:r>
-            <a:r>
-              <a:rPr lang="en-US" dirty="0">
-                <a:hlinkClick r:id="rId2"/>
-              </a:rPr>
-              <a:t>http://youtube.com/angularjs</a:t>
+              <a:t>https://</a:t>
+            </a:r>
+            <a:r>
+              <a:rPr lang="en-US" dirty="0" err="1"/>
+              <a:t>github.com</a:t>
             </a:r>
             <a:r>
               <a:rPr lang="en-US" dirty="0"/>
-              <a:t> </a:t>
-            </a:r>
-          </a:p>
+              <a:t>/</a:t>
+            </a:r>
+            <a:r>
+              <a:rPr lang="en-US" dirty="0" err="1"/>
+              <a:t>briangarofola</a:t>
+            </a:r>
+            <a:r>
+              <a:rPr lang="en-US" dirty="0"/>
+              <a:t>/</a:t>
+            </a:r>
+            <a:r>
+              <a:rPr lang="en-US" dirty="0" err="1"/>
+              <a:t>angularjs</a:t>
+            </a:r>
+            <a:r>
+              <a:rPr lang="en-US" dirty="0"/>
+              <a:t>-meetup-</a:t>
+            </a:r>
+            <a:r>
+              <a:rPr lang="en-US" dirty="0" err="1"/>
+              <a:t>portland</a:t>
+            </a:r>
+            <a:endParaRPr lang="en-US" dirty="0"/>
+          </a:p>
+        </p:txBody>
+      </p:sp>
+      <p:sp>
+        <p:nvSpPr>
+          <p:cNvPr id="3" name="Title 2"/>
+          <p:cNvSpPr>
+            <a:spLocks noGrp="1"/>
+          </p:cNvSpPr>
+          <p:nvPr>
+            <p:ph type="title"/>
+          </p:nvPr>
+        </p:nvSpPr>
+        <p:spPr/>
+        <p:txBody>
+          <a:bodyPr/>
+          <a:lstStyle/>
           <a:p>
             <a:r>
               <a:rPr lang="en-US" dirty="0" smtClean="0"/>
-              <a:t>Watch John Lindquist’s videos at </a:t>
-            </a:r>
-            <a:r>
-              <a:rPr lang="en-US" dirty="0" smtClean="0">
-                <a:hlinkClick r:id="rId3"/>
-              </a:rPr>
-              <a:t>http://egghead.io</a:t>
-            </a:r>
-            <a:endParaRPr lang="en-US" dirty="0" smtClean="0"/>
-          </a:p>
-          <a:p>
-            <a:r>
-              <a:rPr lang="en-US" dirty="0" smtClean="0"/>
-              <a:t>Use Grunt – clone angular</a:t>
-            </a:r>
-            <a:r>
-              <a:rPr lang="en-US" dirty="0"/>
-              <a:t>-grunt-seed project from </a:t>
-            </a:r>
-            <a:r>
-              <a:rPr lang="en-US" dirty="0" err="1"/>
-              <a:t>Srinivas</a:t>
-            </a:r>
-            <a:r>
-              <a:rPr lang="en-US" dirty="0"/>
-              <a:t> </a:t>
-            </a:r>
-            <a:r>
-              <a:rPr lang="en-US" dirty="0" err="1"/>
-              <a:t>Kusunam</a:t>
-            </a:r>
-            <a:r>
-              <a:rPr lang="en-US" dirty="0"/>
-              <a:t> (architect @ ADP DS</a:t>
-            </a:r>
-            <a:r>
-              <a:rPr lang="en-US" dirty="0" smtClean="0"/>
-              <a:t>) at  </a:t>
-            </a:r>
-            <a:r>
-              <a:rPr lang="en-US" dirty="0">
-                <a:hlinkClick r:id="rId4"/>
-              </a:rPr>
-              <a:t>http://github.com/skusunam/angular-grunt-seed</a:t>
-            </a:r>
-            <a:endParaRPr lang="en-US" dirty="0"/>
-          </a:p>
-          <a:p>
-            <a:r>
-              <a:rPr lang="en-US" dirty="0" smtClean="0"/>
-              <a:t>Test, test, test – use Jasmine </a:t>
-            </a:r>
-            <a:r>
-              <a:rPr lang="en-US" dirty="0"/>
-              <a:t>for BDD at </a:t>
-            </a:r>
-            <a:r>
-              <a:rPr lang="en-US" dirty="0">
-                <a:hlinkClick r:id="rId5"/>
-              </a:rPr>
-              <a:t>https://github.com/pivotal/jasmine</a:t>
-            </a:r>
-            <a:r>
-              <a:rPr lang="en-US" dirty="0" smtClean="0">
-                <a:hlinkClick r:id="rId5"/>
-              </a:rPr>
-              <a:t>/</a:t>
-            </a:r>
-            <a:r>
-              <a:rPr lang="en-US" dirty="0" smtClean="0"/>
-              <a:t> </a:t>
-            </a:r>
-          </a:p>
-          <a:p>
-            <a:r>
-              <a:rPr lang="en-US" dirty="0" smtClean="0"/>
-              <a:t>$provide - Understand Providers, Services, Factories, Values, Constants, </a:t>
-            </a:r>
-            <a:r>
-              <a:rPr lang="en-US" dirty="0" err="1" smtClean="0"/>
-              <a:t>etc</a:t>
-            </a:r>
-            <a:endParaRPr lang="en-US" dirty="0" smtClean="0"/>
-          </a:p>
-          <a:p>
-            <a:r>
-              <a:rPr lang="en-US" dirty="0" smtClean="0"/>
-              <a:t>Fight the urge to manipulate the DOM (with </a:t>
-            </a:r>
-            <a:r>
-              <a:rPr lang="en-US" dirty="0" err="1" smtClean="0"/>
-              <a:t>jQuery</a:t>
-            </a:r>
-            <a:r>
-              <a:rPr lang="en-US" dirty="0" smtClean="0"/>
-              <a:t>)</a:t>
-            </a:r>
-          </a:p>
-          <a:p>
-            <a:r>
-              <a:rPr lang="en-US" dirty="0" smtClean="0"/>
-              <a:t>Get involved and contribute</a:t>
-            </a:r>
-          </a:p>
-        </p:txBody>
-      </p:sp>
-      <p:sp>
-        <p:nvSpPr>
-          <p:cNvPr id="3" name="Title 2"/>
-          <p:cNvSpPr>
-            <a:spLocks noGrp="1"/>
-          </p:cNvSpPr>
-          <p:nvPr>
-            <p:ph type="title"/>
-          </p:nvPr>
-        </p:nvSpPr>
-        <p:spPr/>
-        <p:txBody>
-          <a:bodyPr/>
-          <a:lstStyle/>
-          <a:p>
-            <a:r>
-              <a:rPr lang="en-US" dirty="0" smtClean="0"/>
-              <a:t>ADVICE</a:t>
+              <a:t>Thank you</a:t>
             </a:r>
             <a:endParaRPr lang="en-US" dirty="0"/>
           </a:p>
@@ -5459,7 +5172,7 @@
     </p:spTree>
     <p:extLst>
       <p:ext uri="{BB962C8B-B14F-4D97-AF65-F5344CB8AC3E}">
-        <p14:creationId xmlns:p14="http://schemas.microsoft.com/office/powerpoint/2010/main" val="86815791"/>
+        <p14:creationId xmlns:p14="http://schemas.microsoft.com/office/powerpoint/2010/main" val="4206011269"/>
       </p:ext>
     </p:extLst>
   </p:cSld>
@@ -5644,30 +5357,67 @@
           <a:chExt cx="0" cy="0"/>
         </a:xfrm>
       </p:grpSpPr>
-      <p:pic>
-        <p:nvPicPr>
-          <p:cNvPr id="4" name="Content Placeholder 3"/>
-          <p:cNvPicPr>
-            <a:picLocks noGrp="1" noChangeAspect="1"/>
-          </p:cNvPicPr>
+      <p:sp>
+        <p:nvSpPr>
+          <p:cNvPr id="2" name="Content Placeholder 1"/>
+          <p:cNvSpPr>
+            <a:spLocks noGrp="1"/>
+          </p:cNvSpPr>
           <p:nvPr>
             <p:ph idx="1"/>
           </p:nvPr>
-        </p:nvPicPr>
-        <p:blipFill>
-          <a:blip r:embed="rId3"/>
-          <a:srcRect t="3750" b="3750"/>
-          <a:stretch>
-            <a:fillRect/>
-          </a:stretch>
-        </p:blipFill>
-        <p:spPr>
-          <a:xfrm>
-            <a:off x="757421" y="2085404"/>
-            <a:ext cx="7629159" cy="3999197"/>
-          </a:xfrm>
-        </p:spPr>
-      </p:pic>
+        </p:nvSpPr>
+        <p:spPr/>
+        <p:txBody>
+          <a:bodyPr/>
+          <a:lstStyle/>
+          <a:p>
+            <a:r>
+              <a:rPr lang="en-US" dirty="0" smtClean="0"/>
+              <a:t>Large-scale, greenfield initiative - ~100 engineers at full tilt</a:t>
+            </a:r>
+          </a:p>
+          <a:p>
+            <a:r>
+              <a:rPr lang="en-US" dirty="0" smtClean="0"/>
+              <a:t>Service oriented architecture – autonomous business components (ABC’s)</a:t>
+            </a:r>
+          </a:p>
+          <a:p>
+            <a:r>
+              <a:rPr lang="en-US" dirty="0" smtClean="0"/>
+              <a:t>Composition – data, service, or user interface – we favor UI</a:t>
+            </a:r>
+          </a:p>
+          <a:p>
+            <a:r>
+              <a:rPr lang="en-US" dirty="0" smtClean="0"/>
+              <a:t>Single page application is a complete app in HTML, CSS, and JavaScript</a:t>
+            </a:r>
+          </a:p>
+          <a:p>
+            <a:pPr lvl="1"/>
+            <a:r>
+              <a:rPr lang="en-US" dirty="0" smtClean="0"/>
+              <a:t>a single ‘page’ request</a:t>
+            </a:r>
+          </a:p>
+          <a:p>
+            <a:pPr lvl="1"/>
+            <a:r>
+              <a:rPr lang="en-US" dirty="0" smtClean="0"/>
+              <a:t>Templates on the client</a:t>
+            </a:r>
+          </a:p>
+          <a:p>
+            <a:pPr lvl="1"/>
+            <a:r>
+              <a:rPr lang="en-US" dirty="0" smtClean="0"/>
+              <a:t>Highly dynamic</a:t>
+            </a:r>
+          </a:p>
+        </p:txBody>
+      </p:sp>
       <p:sp>
         <p:nvSpPr>
           <p:cNvPr id="3" name="Title 2"/>
@@ -5685,7 +5435,7 @@
           <a:p>
             <a:r>
               <a:rPr lang="en-US" dirty="0" smtClean="0"/>
-              <a:t>About me</a:t>
+              <a:t>SINGLE PAGE APP ARCHITECTURE</a:t>
             </a:r>
             <a:endParaRPr lang="en-US" dirty="0"/>
           </a:p>
@@ -5694,7 +5444,7 @@
     </p:spTree>
     <p:extLst>
       <p:ext uri="{BB962C8B-B14F-4D97-AF65-F5344CB8AC3E}">
-        <p14:creationId xmlns:p14="http://schemas.microsoft.com/office/powerpoint/2010/main" val="4180308863"/>
+        <p14:creationId xmlns:p14="http://schemas.microsoft.com/office/powerpoint/2010/main" val="779678822"/>
       </p:ext>
     </p:extLst>
   </p:cSld>
@@ -5730,120 +5480,6 @@
       </p:grpSpPr>
       <p:sp>
         <p:nvSpPr>
-          <p:cNvPr id="2" name="Content Placeholder 1"/>
-          <p:cNvSpPr>
-            <a:spLocks noGrp="1"/>
-          </p:cNvSpPr>
-          <p:nvPr>
-            <p:ph idx="1"/>
-          </p:nvPr>
-        </p:nvSpPr>
-        <p:spPr/>
-        <p:txBody>
-          <a:bodyPr/>
-          <a:lstStyle/>
-          <a:p>
-            <a:r>
-              <a:rPr lang="en-US" dirty="0" smtClean="0"/>
-              <a:t>Large-scale, greenfield initiative - ~100 engineers at full tilt</a:t>
-            </a:r>
-          </a:p>
-          <a:p>
-            <a:r>
-              <a:rPr lang="en-US" dirty="0" smtClean="0"/>
-              <a:t>Service oriented architecture – autonomous business components (ABC’s)</a:t>
-            </a:r>
-          </a:p>
-          <a:p>
-            <a:r>
-              <a:rPr lang="en-US" dirty="0" smtClean="0"/>
-              <a:t>Composition – data, service, or user interface – we favor UI</a:t>
-            </a:r>
-          </a:p>
-          <a:p>
-            <a:r>
-              <a:rPr lang="en-US" dirty="0" smtClean="0"/>
-              <a:t>Single page application is a complete app in HTML, CSS, and JavaScript</a:t>
-            </a:r>
-          </a:p>
-          <a:p>
-            <a:pPr lvl="1"/>
-            <a:r>
-              <a:rPr lang="en-US" dirty="0" smtClean="0"/>
-              <a:t>a single ‘page’ request</a:t>
-            </a:r>
-          </a:p>
-          <a:p>
-            <a:pPr lvl="1"/>
-            <a:r>
-              <a:rPr lang="en-US" dirty="0" smtClean="0"/>
-              <a:t>Templates on the client</a:t>
-            </a:r>
-          </a:p>
-          <a:p>
-            <a:pPr lvl="1"/>
-            <a:r>
-              <a:rPr lang="en-US" dirty="0" smtClean="0"/>
-              <a:t>Highly dynamic</a:t>
-            </a:r>
-          </a:p>
-        </p:txBody>
-      </p:sp>
-      <p:sp>
-        <p:nvSpPr>
-          <p:cNvPr id="3" name="Title 2"/>
-          <p:cNvSpPr>
-            <a:spLocks noGrp="1"/>
-          </p:cNvSpPr>
-          <p:nvPr>
-            <p:ph type="title"/>
-          </p:nvPr>
-        </p:nvSpPr>
-        <p:spPr/>
-        <p:txBody>
-          <a:bodyPr/>
-          <a:lstStyle/>
-          <a:p>
-            <a:r>
-              <a:rPr lang="en-US" dirty="0" smtClean="0"/>
-              <a:t>SINGLE PAGE APP ARCHITECTURE</a:t>
-            </a:r>
-            <a:endParaRPr lang="en-US" dirty="0"/>
-          </a:p>
-        </p:txBody>
-      </p:sp>
-    </p:spTree>
-    <p:extLst>
-      <p:ext uri="{BB962C8B-B14F-4D97-AF65-F5344CB8AC3E}">
-        <p14:creationId xmlns:p14="http://schemas.microsoft.com/office/powerpoint/2010/main" val="779678822"/>
-      </p:ext>
-    </p:extLst>
-  </p:cSld>
-  <p:clrMapOvr>
-    <a:masterClrMapping/>
-  </p:clrMapOvr>
-</p:sld>
-</file>
-
-<file path=ppt/slides/slide5.xml><?xml version="1.0" encoding="utf-8"?>
-<p:sld xmlns:a="http://schemas.openxmlformats.org/drawingml/2006/main" xmlns:r="http://schemas.openxmlformats.org/officeDocument/2006/relationships" xmlns:p="http://schemas.openxmlformats.org/presentationml/2006/main">
-  <p:cSld>
-    <p:spTree>
-      <p:nvGrpSpPr>
-        <p:cNvPr id="1" name=""/>
-        <p:cNvGrpSpPr/>
-        <p:nvPr/>
-      </p:nvGrpSpPr>
-      <p:grpSpPr>
-        <a:xfrm>
-          <a:off x="0" y="0"/>
-          <a:ext cx="0" cy="0"/>
-          <a:chOff x="0" y="0"/>
-          <a:chExt cx="0" cy="0"/>
-        </a:xfrm>
-      </p:grpSpPr>
-      <p:sp>
-        <p:nvSpPr>
           <p:cNvPr id="3" name="Title 2"/>
           <p:cNvSpPr>
             <a:spLocks noGrp="1"/>
@@ -5904,7 +5540,7 @@
 </p:sld>
 </file>
 
-<file path=ppt/slides/slide6.xml><?xml version="1.0" encoding="utf-8"?>
+<file path=ppt/slides/slide5.xml><?xml version="1.0" encoding="utf-8"?>
 <p:sld xmlns:a="http://schemas.openxmlformats.org/drawingml/2006/main" xmlns:r="http://schemas.openxmlformats.org/officeDocument/2006/relationships" xmlns:p="http://schemas.openxmlformats.org/presentationml/2006/main">
   <p:cSld>
     <p:spTree>
@@ -6042,7 +5678,7 @@
 </p:sld>
 </file>
 
-<file path=ppt/slides/slide7.xml><?xml version="1.0" encoding="utf-8"?>
+<file path=ppt/slides/slide6.xml><?xml version="1.0" encoding="utf-8"?>
 <p:sld xmlns:a="http://schemas.openxmlformats.org/drawingml/2006/main" xmlns:r="http://schemas.openxmlformats.org/officeDocument/2006/relationships" xmlns:p="http://schemas.openxmlformats.org/presentationml/2006/main">
   <p:cSld>
     <p:spTree>
@@ -6214,7 +5850,7 @@
 </p:sld>
 </file>
 
-<file path=ppt/slides/slide8.xml><?xml version="1.0" encoding="utf-8"?>
+<file path=ppt/slides/slide7.xml><?xml version="1.0" encoding="utf-8"?>
 <p:sld xmlns:a="http://schemas.openxmlformats.org/drawingml/2006/main" xmlns:r="http://schemas.openxmlformats.org/officeDocument/2006/relationships" xmlns:p="http://schemas.openxmlformats.org/presentationml/2006/main">
   <p:cSld>
     <p:spTree>
@@ -6352,6 +5988,153 @@
     <p:extLst>
       <p:ext uri="{BB962C8B-B14F-4D97-AF65-F5344CB8AC3E}">
         <p14:creationId xmlns:p14="http://schemas.microsoft.com/office/powerpoint/2010/main" val="4191334459"/>
+      </p:ext>
+    </p:extLst>
+  </p:cSld>
+  <p:clrMapOvr>
+    <a:masterClrMapping/>
+  </p:clrMapOvr>
+  <p:timing>
+    <p:tnLst>
+      <p:par>
+        <p:cTn xmlns:p14="http://schemas.microsoft.com/office/powerpoint/2010/main" id="1" dur="indefinite" restart="never" nodeType="tmRoot"/>
+      </p:par>
+    </p:tnLst>
+  </p:timing>
+</p:sld>
+</file>
+
+<file path=ppt/slides/slide8.xml><?xml version="1.0" encoding="utf-8"?>
+<p:sld xmlns:a="http://schemas.openxmlformats.org/drawingml/2006/main" xmlns:r="http://schemas.openxmlformats.org/officeDocument/2006/relationships" xmlns:p="http://schemas.openxmlformats.org/presentationml/2006/main">
+  <p:cSld>
+    <p:spTree>
+      <p:nvGrpSpPr>
+        <p:cNvPr id="1" name=""/>
+        <p:cNvGrpSpPr/>
+        <p:nvPr/>
+      </p:nvGrpSpPr>
+      <p:grpSpPr>
+        <a:xfrm>
+          <a:off x="0" y="0"/>
+          <a:ext cx="0" cy="0"/>
+          <a:chOff x="0" y="0"/>
+          <a:chExt cx="0" cy="0"/>
+        </a:xfrm>
+      </p:grpSpPr>
+      <p:sp>
+        <p:nvSpPr>
+          <p:cNvPr id="2" name="Content Placeholder 1"/>
+          <p:cNvSpPr>
+            <a:spLocks noGrp="1"/>
+          </p:cNvSpPr>
+          <p:nvPr>
+            <p:ph idx="1"/>
+          </p:nvPr>
+        </p:nvSpPr>
+        <p:spPr/>
+        <p:txBody>
+          <a:bodyPr/>
+          <a:lstStyle/>
+          <a:p>
+            <a:r>
+              <a:rPr lang="en-US" dirty="0" smtClean="0"/>
+              <a:t>Ability to teach HTML new tricks with custom DSL’s</a:t>
+            </a:r>
+          </a:p>
+          <a:p>
+            <a:r>
+              <a:rPr lang="en-US" dirty="0" smtClean="0"/>
+              <a:t>Create reusable components</a:t>
+            </a:r>
+          </a:p>
+          <a:p>
+            <a:r>
+              <a:rPr lang="en-US" dirty="0" smtClean="0"/>
+              <a:t>Separation of directive template from code enables testability</a:t>
+            </a:r>
+          </a:p>
+        </p:txBody>
+      </p:sp>
+      <p:sp>
+        <p:nvSpPr>
+          <p:cNvPr id="3" name="Title 2"/>
+          <p:cNvSpPr>
+            <a:spLocks noGrp="1"/>
+          </p:cNvSpPr>
+          <p:nvPr>
+            <p:ph type="title"/>
+          </p:nvPr>
+        </p:nvSpPr>
+        <p:spPr/>
+        <p:txBody>
+          <a:bodyPr/>
+          <a:lstStyle/>
+          <a:p>
+            <a:r>
+              <a:rPr lang="en-US" dirty="0" smtClean="0"/>
+              <a:t>directives</a:t>
+            </a:r>
+            <a:endParaRPr lang="en-US" dirty="0"/>
+          </a:p>
+        </p:txBody>
+      </p:sp>
+      <p:sp>
+        <p:nvSpPr>
+          <p:cNvPr id="4" name="TextBox 3"/>
+          <p:cNvSpPr txBox="1"/>
+          <p:nvPr/>
+        </p:nvSpPr>
+        <p:spPr>
+          <a:xfrm>
+            <a:off x="1418333" y="4105134"/>
+            <a:ext cx="6307335" cy="1077218"/>
+          </a:xfrm>
+          <a:prstGeom prst="rect">
+            <a:avLst/>
+          </a:prstGeom>
+        </p:spPr>
+        <p:style>
+          <a:lnRef idx="2">
+            <a:schemeClr val="accent6">
+              <a:shade val="50000"/>
+            </a:schemeClr>
+          </a:lnRef>
+          <a:fillRef idx="1">
+            <a:schemeClr val="accent6"/>
+          </a:fillRef>
+          <a:effectRef idx="0">
+            <a:schemeClr val="accent6"/>
+          </a:effectRef>
+          <a:fontRef idx="minor">
+            <a:schemeClr val="lt1"/>
+          </a:fontRef>
+        </p:style>
+        <p:txBody>
+          <a:bodyPr wrap="none" rtlCol="0">
+            <a:spAutoFit/>
+          </a:bodyPr>
+          <a:lstStyle/>
+          <a:p>
+            <a:pPr algn="ctr"/>
+            <a:r>
+              <a:rPr lang="en-US" sz="3200" i="1" dirty="0" smtClean="0"/>
+              <a:t>Less code - </a:t>
+            </a:r>
+          </a:p>
+          <a:p>
+            <a:pPr algn="ctr"/>
+            <a:r>
+              <a:rPr lang="en-US" sz="3200" i="1" dirty="0" smtClean="0"/>
+              <a:t>Easier to test &amp; More maintainable</a:t>
+            </a:r>
+            <a:endParaRPr lang="en-US" sz="3200" i="1" dirty="0"/>
+          </a:p>
+        </p:txBody>
+      </p:sp>
+    </p:spTree>
+    <p:extLst>
+      <p:ext uri="{BB962C8B-B14F-4D97-AF65-F5344CB8AC3E}">
+        <p14:creationId xmlns:p14="http://schemas.microsoft.com/office/powerpoint/2010/main" val="605492833"/>
       </p:ext>
     </p:extLst>
   </p:cSld>
@@ -6402,20 +6185,23 @@
           <a:p>
             <a:r>
               <a:rPr lang="en-US" dirty="0" smtClean="0"/>
-              <a:t>Ability to teach HTML new tricks with custom DSL’s</a:t>
+              <a:t>Don’t call us, we’ll call you</a:t>
             </a:r>
           </a:p>
           <a:p>
             <a:r>
               <a:rPr lang="en-US" dirty="0" smtClean="0"/>
-              <a:t>Create reusable components</a:t>
+              <a:t>Mock dependencies for fast, clean unit tests</a:t>
             </a:r>
           </a:p>
           <a:p>
             <a:r>
               <a:rPr lang="en-US" dirty="0" smtClean="0"/>
-              <a:t>Separation of directive template from code enables testability</a:t>
-            </a:r>
+              <a:t>Reduce unnecessary, boilerplate object construction code</a:t>
+            </a:r>
+          </a:p>
+          <a:p>
+            <a:endParaRPr lang="en-US" dirty="0"/>
           </a:p>
         </p:txBody>
       </p:sp>
@@ -6436,7 +6222,7 @@
           <a:p>
             <a:r>
               <a:rPr lang="en-US" dirty="0" smtClean="0"/>
-              <a:t>directives</a:t>
+              <a:t>Dependency Injection</a:t>
             </a:r>
             <a:endParaRPr lang="en-US" dirty="0"/>
           </a:p>
@@ -6450,7 +6236,7 @@
         </p:nvSpPr>
         <p:spPr>
           <a:xfrm>
-            <a:off x="1418333" y="4105134"/>
+            <a:off x="1418333" y="3658510"/>
             <a:ext cx="6307335" cy="1077218"/>
           </a:xfrm>
           <a:prstGeom prst="rect">
@@ -6498,7 +6284,7 @@
     </p:spTree>
     <p:extLst>
       <p:ext uri="{BB962C8B-B14F-4D97-AF65-F5344CB8AC3E}">
-        <p14:creationId xmlns:p14="http://schemas.microsoft.com/office/powerpoint/2010/main" val="605492833"/>
+        <p14:creationId xmlns:p14="http://schemas.microsoft.com/office/powerpoint/2010/main" val="1193094378"/>
       </p:ext>
     </p:extLst>
   </p:cSld>

</xml_diff>